<commit_message>
material clase 5 actualizado
</commit_message>
<xml_diff>
--- a/clase_6/teoria/Clase_6.pptx
+++ b/clase_6/teoria/Clase_6.pptx
@@ -5,7 +5,7 @@
     <p:sldMasterId id="2147483648" r:id="rId1"/>
   </p:sldMasterIdLst>
   <p:notesMasterIdLst>
-    <p:notesMasterId r:id="rId37"/>
+    <p:notesMasterId r:id="rId41"/>
   </p:notesMasterIdLst>
   <p:sldIdLst>
     <p:sldId id="256" r:id="rId2"/>
@@ -24,35 +24,39 @@
     <p:sldId id="269" r:id="rId15"/>
     <p:sldId id="270" r:id="rId16"/>
     <p:sldId id="271" r:id="rId17"/>
-    <p:sldId id="272" r:id="rId18"/>
-    <p:sldId id="279" r:id="rId19"/>
-    <p:sldId id="273" r:id="rId20"/>
-    <p:sldId id="274" r:id="rId21"/>
-    <p:sldId id="275" r:id="rId22"/>
-    <p:sldId id="276" r:id="rId23"/>
-    <p:sldId id="277" r:id="rId24"/>
-    <p:sldId id="278" r:id="rId25"/>
-    <p:sldId id="290" r:id="rId26"/>
-    <p:sldId id="280" r:id="rId27"/>
-    <p:sldId id="281" r:id="rId28"/>
-    <p:sldId id="282" r:id="rId29"/>
-    <p:sldId id="283" r:id="rId30"/>
-    <p:sldId id="284" r:id="rId31"/>
-    <p:sldId id="285" r:id="rId32"/>
-    <p:sldId id="286" r:id="rId33"/>
-    <p:sldId id="287" r:id="rId34"/>
-    <p:sldId id="288" r:id="rId35"/>
-    <p:sldId id="289" r:id="rId36"/>
+    <p:sldId id="291" r:id="rId18"/>
+    <p:sldId id="292" r:id="rId19"/>
+    <p:sldId id="293" r:id="rId20"/>
+    <p:sldId id="294" r:id="rId21"/>
+    <p:sldId id="272" r:id="rId22"/>
+    <p:sldId id="279" r:id="rId23"/>
+    <p:sldId id="273" r:id="rId24"/>
+    <p:sldId id="274" r:id="rId25"/>
+    <p:sldId id="275" r:id="rId26"/>
+    <p:sldId id="276" r:id="rId27"/>
+    <p:sldId id="277" r:id="rId28"/>
+    <p:sldId id="278" r:id="rId29"/>
+    <p:sldId id="290" r:id="rId30"/>
+    <p:sldId id="280" r:id="rId31"/>
+    <p:sldId id="281" r:id="rId32"/>
+    <p:sldId id="282" r:id="rId33"/>
+    <p:sldId id="283" r:id="rId34"/>
+    <p:sldId id="284" r:id="rId35"/>
+    <p:sldId id="285" r:id="rId36"/>
+    <p:sldId id="286" r:id="rId37"/>
+    <p:sldId id="287" r:id="rId38"/>
+    <p:sldId id="288" r:id="rId39"/>
+    <p:sldId id="289" r:id="rId40"/>
   </p:sldIdLst>
   <p:sldSz cx="9144000" cy="5143500" type="screen16x9"/>
   <p:notesSz cx="6858000" cy="9144000"/>
   <p:embeddedFontLst>
     <p:embeddedFont>
       <p:font typeface="Roboto" panose="02000000000000000000" pitchFamily="2" charset="0"/>
-      <p:regular r:id="rId38"/>
-      <p:bold r:id="rId39"/>
-      <p:italic r:id="rId40"/>
-      <p:boldItalic r:id="rId41"/>
+      <p:regular r:id="rId42"/>
+      <p:bold r:id="rId43"/>
+      <p:italic r:id="rId44"/>
+      <p:boldItalic r:id="rId45"/>
     </p:embeddedFont>
   </p:embeddedFontLst>
   <p:defaultTextStyle>
@@ -300,7 +304,7 @@
       </p15:sldGuideLst>
     </p:ext>
     <p:ext uri="GoogleSlidesCustomDataVersion2">
-      <go:slidesCustomData xmlns="" xmlns:mc="http://schemas.openxmlformats.org/markup-compatibility/2006" xmlns:mv="urn:schemas-microsoft-com:mac:vml" xmlns:c="http://schemas.openxmlformats.org/drawingml/2006/chart" xmlns:dgm="http://schemas.openxmlformats.org/drawingml/2006/diagram" xmlns:o="urn:schemas-microsoft-com:office:office" xmlns:v="urn:schemas-microsoft-com:vml" xmlns:pvml="urn:schemas-microsoft-com:office:powerpoint" xmlns:com="http://schemas.openxmlformats.org/drawingml/2006/compatibility" xmlns:p14="http://schemas.microsoft.com/office/powerpoint/2010/main" xmlns:p15="http://schemas.microsoft.com/office/powerpoint/2012/main" xmlns:ahyp="http://schemas.microsoft.com/office/drawing/2018/hyperlinkcolor" xmlns:go="http://customooxmlschemas.google.com/" r:id="rId45" roundtripDataSignature="AMtx7mi43qeBuG6xuqWiq1Kh9QyGOyIiNg=="/>
+      <go:slidesCustomData xmlns:go="http://customooxmlschemas.google.com/" xmlns:ahyp="http://schemas.microsoft.com/office/drawing/2018/hyperlinkcolor" xmlns:p15="http://schemas.microsoft.com/office/powerpoint/2012/main" xmlns:p14="http://schemas.microsoft.com/office/powerpoint/2010/main" xmlns:com="http://schemas.openxmlformats.org/drawingml/2006/compatibility" xmlns:pvml="urn:schemas-microsoft-com:office:powerpoint" xmlns:v="urn:schemas-microsoft-com:vml" xmlns:o="urn:schemas-microsoft-com:office:office" xmlns:dgm="http://schemas.openxmlformats.org/drawingml/2006/diagram" xmlns:c="http://schemas.openxmlformats.org/drawingml/2006/chart" xmlns:mv="urn:schemas-microsoft-com:mac:vml" xmlns:mc="http://schemas.openxmlformats.org/markup-compatibility/2006" xmlns="" r:id="rId46" roundtripDataSignature="AMtx7mi43qeBuG6xuqWiq1Kh9QyGOyIiNg=="/>
     </p:ext>
   </p:extLst>
 </p:presentation>
@@ -309,13 +313,201 @@
 <file path=ppt/revisionInfo.xml><?xml version="1.0" encoding="utf-8"?>
 <p1510:revInfo xmlns:a="http://schemas.openxmlformats.org/drawingml/2006/main" xmlns:r="http://schemas.openxmlformats.org/officeDocument/2006/relationships" xmlns:p1510="http://schemas.microsoft.com/office/powerpoint/2015/10/main">
   <p1510:revLst>
-    <p1510:client id="{EE2FC811-F246-4E28-936B-C5BA500BDF68}" v="2" dt="2024-10-01T23:22:51.549"/>
+    <p1510:client id="{6875A249-7888-4363-9F92-056EB10F7CD5}" v="4" dt="2024-11-29T21:38:32.764"/>
   </p1510:revLst>
 </p1510:revInfo>
 </file>
 
 <file path=ppt/changesInfos/changesInfo1.xml><?xml version="1.0" encoding="utf-8"?>
 <pc:chgInfo xmlns:a="http://schemas.openxmlformats.org/drawingml/2006/main" xmlns:r="http://schemas.openxmlformats.org/officeDocument/2006/relationships" xmlns:ac="http://schemas.microsoft.com/office/drawing/2013/main/command" xmlns:pc="http://schemas.microsoft.com/office/powerpoint/2013/main/command">
+  <pc:docChgLst>
+    <pc:chgData name="Marcos Maillot" userId="fa14b39d-e966-4ebb-a436-4f96f84b9577" providerId="ADAL" clId="{6875A249-7888-4363-9F92-056EB10F7CD5}"/>
+    <pc:docChg chg="custSel addSld modSld">
+      <pc:chgData name="Marcos Maillot" userId="fa14b39d-e966-4ebb-a436-4f96f84b9577" providerId="ADAL" clId="{6875A249-7888-4363-9F92-056EB10F7CD5}" dt="2024-11-29T21:45:30.394" v="57" actId="14100"/>
+      <pc:docMkLst>
+        <pc:docMk/>
+      </pc:docMkLst>
+      <pc:sldChg chg="modSp mod">
+        <pc:chgData name="Marcos Maillot" userId="fa14b39d-e966-4ebb-a436-4f96f84b9577" providerId="ADAL" clId="{6875A249-7888-4363-9F92-056EB10F7CD5}" dt="2024-11-29T21:45:30.394" v="57" actId="14100"/>
+        <pc:sldMkLst>
+          <pc:docMk/>
+          <pc:sldMk cId="0" sldId="278"/>
+        </pc:sldMkLst>
+        <pc:spChg chg="mod">
+          <ac:chgData name="Marcos Maillot" userId="fa14b39d-e966-4ebb-a436-4f96f84b9577" providerId="ADAL" clId="{6875A249-7888-4363-9F92-056EB10F7CD5}" dt="2024-11-29T21:45:30.394" v="57" actId="14100"/>
+          <ac:spMkLst>
+            <pc:docMk/>
+            <pc:sldMk cId="0" sldId="278"/>
+            <ac:spMk id="292" creationId="{00000000-0000-0000-0000-000000000000}"/>
+          </ac:spMkLst>
+        </pc:spChg>
+      </pc:sldChg>
+      <pc:sldChg chg="addSp delSp modSp add mod">
+        <pc:chgData name="Marcos Maillot" userId="fa14b39d-e966-4ebb-a436-4f96f84b9577" providerId="ADAL" clId="{6875A249-7888-4363-9F92-056EB10F7CD5}" dt="2024-11-29T21:34:44.944" v="9" actId="1076"/>
+        <pc:sldMkLst>
+          <pc:docMk/>
+          <pc:sldMk cId="3137623413" sldId="291"/>
+        </pc:sldMkLst>
+        <pc:spChg chg="del">
+          <ac:chgData name="Marcos Maillot" userId="fa14b39d-e966-4ebb-a436-4f96f84b9577" providerId="ADAL" clId="{6875A249-7888-4363-9F92-056EB10F7CD5}" dt="2024-11-29T21:34:16.974" v="3" actId="478"/>
+          <ac:spMkLst>
+            <pc:docMk/>
+            <pc:sldMk cId="3137623413" sldId="291"/>
+            <ac:spMk id="228" creationId="{00000000-0000-0000-0000-000000000000}"/>
+          </ac:spMkLst>
+        </pc:spChg>
+        <pc:picChg chg="add mod">
+          <ac:chgData name="Marcos Maillot" userId="fa14b39d-e966-4ebb-a436-4f96f84b9577" providerId="ADAL" clId="{6875A249-7888-4363-9F92-056EB10F7CD5}" dt="2024-11-29T21:34:44.944" v="9" actId="1076"/>
+          <ac:picMkLst>
+            <pc:docMk/>
+            <pc:sldMk cId="3137623413" sldId="291"/>
+            <ac:picMk id="3" creationId="{8F1DAAD6-642B-8E32-7DA6-4C42DEB7AE84}"/>
+          </ac:picMkLst>
+        </pc:picChg>
+        <pc:picChg chg="del">
+          <ac:chgData name="Marcos Maillot" userId="fa14b39d-e966-4ebb-a436-4f96f84b9577" providerId="ADAL" clId="{6875A249-7888-4363-9F92-056EB10F7CD5}" dt="2024-11-29T21:34:14.845" v="1" actId="478"/>
+          <ac:picMkLst>
+            <pc:docMk/>
+            <pc:sldMk cId="3137623413" sldId="291"/>
+            <ac:picMk id="229" creationId="{00000000-0000-0000-0000-000000000000}"/>
+          </ac:picMkLst>
+        </pc:picChg>
+        <pc:picChg chg="del">
+          <ac:chgData name="Marcos Maillot" userId="fa14b39d-e966-4ebb-a436-4f96f84b9577" providerId="ADAL" clId="{6875A249-7888-4363-9F92-056EB10F7CD5}" dt="2024-11-29T21:34:15.364" v="2" actId="478"/>
+          <ac:picMkLst>
+            <pc:docMk/>
+            <pc:sldMk cId="3137623413" sldId="291"/>
+            <ac:picMk id="230" creationId="{00000000-0000-0000-0000-000000000000}"/>
+          </ac:picMkLst>
+        </pc:picChg>
+      </pc:sldChg>
+      <pc:sldChg chg="addSp modSp add mod">
+        <pc:chgData name="Marcos Maillot" userId="fa14b39d-e966-4ebb-a436-4f96f84b9577" providerId="ADAL" clId="{6875A249-7888-4363-9F92-056EB10F7CD5}" dt="2024-11-29T21:36:07.654" v="22" actId="1076"/>
+        <pc:sldMkLst>
+          <pc:docMk/>
+          <pc:sldMk cId="4139229005" sldId="292"/>
+        </pc:sldMkLst>
+        <pc:picChg chg="add mod">
+          <ac:chgData name="Marcos Maillot" userId="fa14b39d-e966-4ebb-a436-4f96f84b9577" providerId="ADAL" clId="{6875A249-7888-4363-9F92-056EB10F7CD5}" dt="2024-11-29T21:36:06.744" v="21" actId="1076"/>
+          <ac:picMkLst>
+            <pc:docMk/>
+            <pc:sldMk cId="4139229005" sldId="292"/>
+            <ac:picMk id="3" creationId="{9D03D3F5-78BB-F2CD-C53D-8B1DBEE3127E}"/>
+          </ac:picMkLst>
+        </pc:picChg>
+        <pc:picChg chg="add mod">
+          <ac:chgData name="Marcos Maillot" userId="fa14b39d-e966-4ebb-a436-4f96f84b9577" providerId="ADAL" clId="{6875A249-7888-4363-9F92-056EB10F7CD5}" dt="2024-11-29T21:36:07.654" v="22" actId="1076"/>
+          <ac:picMkLst>
+            <pc:docMk/>
+            <pc:sldMk cId="4139229005" sldId="292"/>
+            <ac:picMk id="5" creationId="{110F3932-C008-1E37-1FF6-D1612E5685BF}"/>
+          </ac:picMkLst>
+        </pc:picChg>
+        <pc:picChg chg="add mod">
+          <ac:chgData name="Marcos Maillot" userId="fa14b39d-e966-4ebb-a436-4f96f84b9577" providerId="ADAL" clId="{6875A249-7888-4363-9F92-056EB10F7CD5}" dt="2024-11-29T21:36:03.634" v="20" actId="1076"/>
+          <ac:picMkLst>
+            <pc:docMk/>
+            <pc:sldMk cId="4139229005" sldId="292"/>
+            <ac:picMk id="7" creationId="{B086223D-3C92-320C-FDA4-2986A3EC8B24}"/>
+          </ac:picMkLst>
+        </pc:picChg>
+      </pc:sldChg>
+      <pc:sldChg chg="addSp delSp modSp add mod">
+        <pc:chgData name="Marcos Maillot" userId="fa14b39d-e966-4ebb-a436-4f96f84b9577" providerId="ADAL" clId="{6875A249-7888-4363-9F92-056EB10F7CD5}" dt="2024-11-29T21:37:21.674" v="39" actId="1076"/>
+        <pc:sldMkLst>
+          <pc:docMk/>
+          <pc:sldMk cId="3179616302" sldId="293"/>
+        </pc:sldMkLst>
+        <pc:picChg chg="add mod">
+          <ac:chgData name="Marcos Maillot" userId="fa14b39d-e966-4ebb-a436-4f96f84b9577" providerId="ADAL" clId="{6875A249-7888-4363-9F92-056EB10F7CD5}" dt="2024-11-29T21:36:33.314" v="24" actId="1076"/>
+          <ac:picMkLst>
+            <pc:docMk/>
+            <pc:sldMk cId="3179616302" sldId="293"/>
+            <ac:picMk id="3" creationId="{07F6C8A2-6E4B-CC35-FBCA-FE785C2AC540}"/>
+          </ac:picMkLst>
+        </pc:picChg>
+        <pc:picChg chg="add del mod">
+          <ac:chgData name="Marcos Maillot" userId="fa14b39d-e966-4ebb-a436-4f96f84b9577" providerId="ADAL" clId="{6875A249-7888-4363-9F92-056EB10F7CD5}" dt="2024-11-29T21:36:55.644" v="29" actId="478"/>
+          <ac:picMkLst>
+            <pc:docMk/>
+            <pc:sldMk cId="3179616302" sldId="293"/>
+            <ac:picMk id="5" creationId="{A4DF4F69-9F50-704D-18F5-7AC6F118922E}"/>
+          </ac:picMkLst>
+        </pc:picChg>
+        <pc:picChg chg="add mod">
+          <ac:chgData name="Marcos Maillot" userId="fa14b39d-e966-4ebb-a436-4f96f84b9577" providerId="ADAL" clId="{6875A249-7888-4363-9F92-056EB10F7CD5}" dt="2024-11-29T21:37:20.124" v="38" actId="1076"/>
+          <ac:picMkLst>
+            <pc:docMk/>
+            <pc:sldMk cId="3179616302" sldId="293"/>
+            <ac:picMk id="7" creationId="{E9CEA9F8-4C91-6372-E31C-322AD64E5DF3}"/>
+          </ac:picMkLst>
+        </pc:picChg>
+        <pc:picChg chg="add mod">
+          <ac:chgData name="Marcos Maillot" userId="fa14b39d-e966-4ebb-a436-4f96f84b9577" providerId="ADAL" clId="{6875A249-7888-4363-9F92-056EB10F7CD5}" dt="2024-11-29T21:37:21.674" v="39" actId="1076"/>
+          <ac:picMkLst>
+            <pc:docMk/>
+            <pc:sldMk cId="3179616302" sldId="293"/>
+            <ac:picMk id="9" creationId="{6F1E6A7D-9012-4072-5AB5-CCB5A5C9F10B}"/>
+          </ac:picMkLst>
+        </pc:picChg>
+      </pc:sldChg>
+      <pc:sldChg chg="addSp delSp modSp add mod">
+        <pc:chgData name="Marcos Maillot" userId="fa14b39d-e966-4ebb-a436-4f96f84b9577" providerId="ADAL" clId="{6875A249-7888-4363-9F92-056EB10F7CD5}" dt="2024-11-29T21:39:33.364" v="55" actId="1076"/>
+        <pc:sldMkLst>
+          <pc:docMk/>
+          <pc:sldMk cId="1421602177" sldId="294"/>
+        </pc:sldMkLst>
+        <pc:picChg chg="del">
+          <ac:chgData name="Marcos Maillot" userId="fa14b39d-e966-4ebb-a436-4f96f84b9577" providerId="ADAL" clId="{6875A249-7888-4363-9F92-056EB10F7CD5}" dt="2024-11-29T21:38:36.184" v="42" actId="478"/>
+          <ac:picMkLst>
+            <pc:docMk/>
+            <pc:sldMk cId="1421602177" sldId="294"/>
+            <ac:picMk id="3" creationId="{07F6C8A2-6E4B-CC35-FBCA-FE785C2AC540}"/>
+          </ac:picMkLst>
+        </pc:picChg>
+        <pc:picChg chg="add mod">
+          <ac:chgData name="Marcos Maillot" userId="fa14b39d-e966-4ebb-a436-4f96f84b9577" providerId="ADAL" clId="{6875A249-7888-4363-9F92-056EB10F7CD5}" dt="2024-11-29T21:39:05.294" v="45" actId="1076"/>
+          <ac:picMkLst>
+            <pc:docMk/>
+            <pc:sldMk cId="1421602177" sldId="294"/>
+            <ac:picMk id="4" creationId="{B1E56B2D-1A7E-B595-8FDB-6BA836414150}"/>
+          </ac:picMkLst>
+        </pc:picChg>
+        <pc:picChg chg="add mod">
+          <ac:chgData name="Marcos Maillot" userId="fa14b39d-e966-4ebb-a436-4f96f84b9577" providerId="ADAL" clId="{6875A249-7888-4363-9F92-056EB10F7CD5}" dt="2024-11-29T21:39:33.364" v="55" actId="1076"/>
+          <ac:picMkLst>
+            <pc:docMk/>
+            <pc:sldMk cId="1421602177" sldId="294"/>
+            <ac:picMk id="6" creationId="{3B87B3A4-251A-0315-F9EE-DAD61ADCB9DF}"/>
+          </ac:picMkLst>
+        </pc:picChg>
+        <pc:picChg chg="del">
+          <ac:chgData name="Marcos Maillot" userId="fa14b39d-e966-4ebb-a436-4f96f84b9577" providerId="ADAL" clId="{6875A249-7888-4363-9F92-056EB10F7CD5}" dt="2024-11-29T21:38:36.664" v="43" actId="478"/>
+          <ac:picMkLst>
+            <pc:docMk/>
+            <pc:sldMk cId="1421602177" sldId="294"/>
+            <ac:picMk id="7" creationId="{E9CEA9F8-4C91-6372-E31C-322AD64E5DF3}"/>
+          </ac:picMkLst>
+        </pc:picChg>
+        <pc:picChg chg="del">
+          <ac:chgData name="Marcos Maillot" userId="fa14b39d-e966-4ebb-a436-4f96f84b9577" providerId="ADAL" clId="{6875A249-7888-4363-9F92-056EB10F7CD5}" dt="2024-11-29T21:38:35.204" v="41" actId="478"/>
+          <ac:picMkLst>
+            <pc:docMk/>
+            <pc:sldMk cId="1421602177" sldId="294"/>
+            <ac:picMk id="9" creationId="{6F1E6A7D-9012-4072-5AB5-CCB5A5C9F10B}"/>
+          </ac:picMkLst>
+        </pc:picChg>
+        <pc:picChg chg="add mod">
+          <ac:chgData name="Marcos Maillot" userId="fa14b39d-e966-4ebb-a436-4f96f84b9577" providerId="ADAL" clId="{6875A249-7888-4363-9F92-056EB10F7CD5}" dt="2024-11-29T21:39:31.909" v="54" actId="1076"/>
+          <ac:picMkLst>
+            <pc:docMk/>
+            <pc:sldMk cId="1421602177" sldId="294"/>
+            <ac:picMk id="10" creationId="{21ECE62E-087E-6FA4-B8E1-ECB992A69997}"/>
+          </ac:picMkLst>
+        </pc:picChg>
+      </pc:sldChg>
+    </pc:docChg>
+  </pc:docChgLst>
   <pc:docChgLst>
     <pc:chgData name="Marcos Maillot" userId="fa14b39d-e966-4ebb-a436-4f96f84b9577" providerId="ADAL" clId="{EE2FC811-F246-4E28-936B-C5BA500BDF68}"/>
     <pc:docChg chg="undo custSel addSld modSld sldOrd">
@@ -1947,7 +2139,7 @@
   <p:cSld>
     <p:spTree>
       <p:nvGrpSpPr>
-        <p:cNvPr id="1" name="Shape 232"/>
+        <p:cNvPr id="1" name="Shape 223"/>
         <p:cNvGrpSpPr/>
         <p:nvPr/>
       </p:nvGrpSpPr>
@@ -1961,7 +2153,7 @@
       </p:grpSpPr>
       <p:sp>
         <p:nvSpPr>
-          <p:cNvPr id="233" name="Google Shape;233;g21c03c1d1e6_1_133:notes"/>
+          <p:cNvPr id="224" name="Google Shape;224;g21c03c1d1e6_1_126:notes"/>
           <p:cNvSpPr txBox="1">
             <a:spLocks noGrp="1"/>
           </p:cNvSpPr>
@@ -1999,7 +2191,7 @@
       </p:sp>
       <p:sp>
         <p:nvSpPr>
-          <p:cNvPr id="234" name="Google Shape;234;g21c03c1d1e6_1_133:notes"/>
+          <p:cNvPr id="225" name="Google Shape;225;g21c03c1d1e6_1_126:notes"/>
           <p:cNvSpPr>
             <a:spLocks noGrp="1" noRot="1" noChangeAspect="1"/>
           </p:cNvSpPr>
@@ -2039,6 +2231,11 @@
         </p:spPr>
       </p:sp>
     </p:spTree>
+    <p:extLst>
+      <p:ext uri="{BB962C8B-B14F-4D97-AF65-F5344CB8AC3E}">
+        <p14:creationId xmlns:p14="http://schemas.microsoft.com/office/powerpoint/2010/main" val="3494220003"/>
+      </p:ext>
+    </p:extLst>
   </p:cSld>
   <p:clrMapOvr>
     <a:masterClrMapping/>
@@ -2051,7 +2248,7 @@
   <p:cSld>
     <p:spTree>
       <p:nvGrpSpPr>
-        <p:cNvPr id="1" name="Shape 296"/>
+        <p:cNvPr id="1" name="Shape 223"/>
         <p:cNvGrpSpPr/>
         <p:nvPr/>
       </p:nvGrpSpPr>
@@ -2065,7 +2262,7 @@
       </p:grpSpPr>
       <p:sp>
         <p:nvSpPr>
-          <p:cNvPr id="297" name="Google Shape;297;g21c03c1d1e6_1_187:notes"/>
+          <p:cNvPr id="224" name="Google Shape;224;g21c03c1d1e6_1_126:notes"/>
           <p:cNvSpPr txBox="1">
             <a:spLocks noGrp="1"/>
           </p:cNvSpPr>
@@ -2103,7 +2300,7 @@
       </p:sp>
       <p:sp>
         <p:nvSpPr>
-          <p:cNvPr id="298" name="Google Shape;298;g21c03c1d1e6_1_187:notes"/>
+          <p:cNvPr id="225" name="Google Shape;225;g21c03c1d1e6_1_126:notes"/>
           <p:cNvSpPr>
             <a:spLocks noGrp="1" noRot="1" noChangeAspect="1"/>
           </p:cNvSpPr>
@@ -2143,6 +2340,11 @@
         </p:spPr>
       </p:sp>
     </p:spTree>
+    <p:extLst>
+      <p:ext uri="{BB962C8B-B14F-4D97-AF65-F5344CB8AC3E}">
+        <p14:creationId xmlns:p14="http://schemas.microsoft.com/office/powerpoint/2010/main" val="1872074978"/>
+      </p:ext>
+    </p:extLst>
   </p:cSld>
   <p:clrMapOvr>
     <a:masterClrMapping/>
@@ -2155,7 +2357,7 @@
   <p:cSld>
     <p:spTree>
       <p:nvGrpSpPr>
-        <p:cNvPr id="1" name="Shape 241"/>
+        <p:cNvPr id="1" name="Shape 223"/>
         <p:cNvGrpSpPr/>
         <p:nvPr/>
       </p:nvGrpSpPr>
@@ -2169,7 +2371,7 @@
       </p:grpSpPr>
       <p:sp>
         <p:nvSpPr>
-          <p:cNvPr id="242" name="Google Shape;242;g21c03c1d1e6_1_140:notes"/>
+          <p:cNvPr id="224" name="Google Shape;224;g21c03c1d1e6_1_126:notes"/>
           <p:cNvSpPr txBox="1">
             <a:spLocks noGrp="1"/>
           </p:cNvSpPr>
@@ -2207,7 +2409,7 @@
       </p:sp>
       <p:sp>
         <p:nvSpPr>
-          <p:cNvPr id="243" name="Google Shape;243;g21c03c1d1e6_1_140:notes"/>
+          <p:cNvPr id="225" name="Google Shape;225;g21c03c1d1e6_1_126:notes"/>
           <p:cNvSpPr>
             <a:spLocks noGrp="1" noRot="1" noChangeAspect="1"/>
           </p:cNvSpPr>
@@ -2247,6 +2449,11 @@
         </p:spPr>
       </p:sp>
     </p:spTree>
+    <p:extLst>
+      <p:ext uri="{BB962C8B-B14F-4D97-AF65-F5344CB8AC3E}">
+        <p14:creationId xmlns:p14="http://schemas.microsoft.com/office/powerpoint/2010/main" val="2235866427"/>
+      </p:ext>
+    </p:extLst>
   </p:cSld>
   <p:clrMapOvr>
     <a:masterClrMapping/>
@@ -2381,6 +2588,427 @@
   <p:cSld>
     <p:spTree>
       <p:nvGrpSpPr>
+        <p:cNvPr id="1" name="Shape 223"/>
+        <p:cNvGrpSpPr/>
+        <p:nvPr/>
+      </p:nvGrpSpPr>
+      <p:grpSpPr>
+        <a:xfrm>
+          <a:off x="0" y="0"/>
+          <a:ext cx="0" cy="0"/>
+          <a:chOff x="0" y="0"/>
+          <a:chExt cx="0" cy="0"/>
+        </a:xfrm>
+      </p:grpSpPr>
+      <p:sp>
+        <p:nvSpPr>
+          <p:cNvPr id="224" name="Google Shape;224;g21c03c1d1e6_1_126:notes"/>
+          <p:cNvSpPr txBox="1">
+            <a:spLocks noGrp="1"/>
+          </p:cNvSpPr>
+          <p:nvPr>
+            <p:ph type="body" idx="1"/>
+          </p:nvPr>
+        </p:nvSpPr>
+        <p:spPr>
+          <a:xfrm>
+            <a:off x="685800" y="4343400"/>
+            <a:ext cx="5486400" cy="4114800"/>
+          </a:xfrm>
+          <a:prstGeom prst="rect">
+            <a:avLst/>
+          </a:prstGeom>
+        </p:spPr>
+        <p:txBody>
+          <a:bodyPr spcFirstLastPara="1" wrap="square" lIns="91425" tIns="91425" rIns="91425" bIns="91425" anchor="t" anchorCtr="0">
+            <a:noAutofit/>
+          </a:bodyPr>
+          <a:lstStyle/>
+          <a:p>
+            <a:pPr marL="0" lvl="0" indent="0" algn="l" rtl="0">
+              <a:spcBef>
+                <a:spcPts val="0"/>
+              </a:spcBef>
+              <a:spcAft>
+                <a:spcPts val="0"/>
+              </a:spcAft>
+              <a:buNone/>
+            </a:pPr>
+            <a:endParaRPr/>
+          </a:p>
+        </p:txBody>
+      </p:sp>
+      <p:sp>
+        <p:nvSpPr>
+          <p:cNvPr id="225" name="Google Shape;225;g21c03c1d1e6_1_126:notes"/>
+          <p:cNvSpPr>
+            <a:spLocks noGrp="1" noRot="1" noChangeAspect="1"/>
+          </p:cNvSpPr>
+          <p:nvPr>
+            <p:ph type="sldImg" idx="2"/>
+          </p:nvPr>
+        </p:nvSpPr>
+        <p:spPr>
+          <a:xfrm>
+            <a:off x="381000" y="685800"/>
+            <a:ext cx="6096000" cy="3429000"/>
+          </a:xfrm>
+          <a:custGeom>
+            <a:avLst/>
+            <a:gdLst/>
+            <a:ahLst/>
+            <a:cxnLst/>
+            <a:rect l="l" t="t" r="r" b="b"/>
+            <a:pathLst>
+              <a:path w="120000" h="120000" extrusionOk="0">
+                <a:moveTo>
+                  <a:pt x="0" y="0"/>
+                </a:moveTo>
+                <a:lnTo>
+                  <a:pt x="120000" y="0"/>
+                </a:lnTo>
+                <a:lnTo>
+                  <a:pt x="120000" y="120000"/>
+                </a:lnTo>
+                <a:lnTo>
+                  <a:pt x="0" y="120000"/>
+                </a:lnTo>
+                <a:close/>
+              </a:path>
+            </a:pathLst>
+          </a:custGeom>
+        </p:spPr>
+      </p:sp>
+    </p:spTree>
+    <p:extLst>
+      <p:ext uri="{BB962C8B-B14F-4D97-AF65-F5344CB8AC3E}">
+        <p14:creationId xmlns:p14="http://schemas.microsoft.com/office/powerpoint/2010/main" val="1271076808"/>
+      </p:ext>
+    </p:extLst>
+  </p:cSld>
+  <p:clrMapOvr>
+    <a:masterClrMapping/>
+  </p:clrMapOvr>
+</p:notes>
+</file>
+
+<file path=ppt/notesSlides/notesSlide21.xml><?xml version="1.0" encoding="utf-8"?>
+<p:notes xmlns:a="http://schemas.openxmlformats.org/drawingml/2006/main" xmlns:r="http://schemas.openxmlformats.org/officeDocument/2006/relationships" xmlns:p="http://schemas.openxmlformats.org/presentationml/2006/main" showMasterSp="0" showMasterPhAnim="0">
+  <p:cSld>
+    <p:spTree>
+      <p:nvGrpSpPr>
+        <p:cNvPr id="1" name="Shape 232"/>
+        <p:cNvGrpSpPr/>
+        <p:nvPr/>
+      </p:nvGrpSpPr>
+      <p:grpSpPr>
+        <a:xfrm>
+          <a:off x="0" y="0"/>
+          <a:ext cx="0" cy="0"/>
+          <a:chOff x="0" y="0"/>
+          <a:chExt cx="0" cy="0"/>
+        </a:xfrm>
+      </p:grpSpPr>
+      <p:sp>
+        <p:nvSpPr>
+          <p:cNvPr id="233" name="Google Shape;233;g21c03c1d1e6_1_133:notes"/>
+          <p:cNvSpPr txBox="1">
+            <a:spLocks noGrp="1"/>
+          </p:cNvSpPr>
+          <p:nvPr>
+            <p:ph type="body" idx="1"/>
+          </p:nvPr>
+        </p:nvSpPr>
+        <p:spPr>
+          <a:xfrm>
+            <a:off x="685800" y="4343400"/>
+            <a:ext cx="5486400" cy="4114800"/>
+          </a:xfrm>
+          <a:prstGeom prst="rect">
+            <a:avLst/>
+          </a:prstGeom>
+        </p:spPr>
+        <p:txBody>
+          <a:bodyPr spcFirstLastPara="1" wrap="square" lIns="91425" tIns="91425" rIns="91425" bIns="91425" anchor="t" anchorCtr="0">
+            <a:noAutofit/>
+          </a:bodyPr>
+          <a:lstStyle/>
+          <a:p>
+            <a:pPr marL="0" lvl="0" indent="0" algn="l" rtl="0">
+              <a:spcBef>
+                <a:spcPts val="0"/>
+              </a:spcBef>
+              <a:spcAft>
+                <a:spcPts val="0"/>
+              </a:spcAft>
+              <a:buNone/>
+            </a:pPr>
+            <a:endParaRPr/>
+          </a:p>
+        </p:txBody>
+      </p:sp>
+      <p:sp>
+        <p:nvSpPr>
+          <p:cNvPr id="234" name="Google Shape;234;g21c03c1d1e6_1_133:notes"/>
+          <p:cNvSpPr>
+            <a:spLocks noGrp="1" noRot="1" noChangeAspect="1"/>
+          </p:cNvSpPr>
+          <p:nvPr>
+            <p:ph type="sldImg" idx="2"/>
+          </p:nvPr>
+        </p:nvSpPr>
+        <p:spPr>
+          <a:xfrm>
+            <a:off x="381000" y="685800"/>
+            <a:ext cx="6096000" cy="3429000"/>
+          </a:xfrm>
+          <a:custGeom>
+            <a:avLst/>
+            <a:gdLst/>
+            <a:ahLst/>
+            <a:cxnLst/>
+            <a:rect l="l" t="t" r="r" b="b"/>
+            <a:pathLst>
+              <a:path w="120000" h="120000" extrusionOk="0">
+                <a:moveTo>
+                  <a:pt x="0" y="0"/>
+                </a:moveTo>
+                <a:lnTo>
+                  <a:pt x="120000" y="0"/>
+                </a:lnTo>
+                <a:lnTo>
+                  <a:pt x="120000" y="120000"/>
+                </a:lnTo>
+                <a:lnTo>
+                  <a:pt x="0" y="120000"/>
+                </a:lnTo>
+                <a:close/>
+              </a:path>
+            </a:pathLst>
+          </a:custGeom>
+        </p:spPr>
+      </p:sp>
+    </p:spTree>
+  </p:cSld>
+  <p:clrMapOvr>
+    <a:masterClrMapping/>
+  </p:clrMapOvr>
+</p:notes>
+</file>
+
+<file path=ppt/notesSlides/notesSlide22.xml><?xml version="1.0" encoding="utf-8"?>
+<p:notes xmlns:a="http://schemas.openxmlformats.org/drawingml/2006/main" xmlns:r="http://schemas.openxmlformats.org/officeDocument/2006/relationships" xmlns:p="http://schemas.openxmlformats.org/presentationml/2006/main" showMasterSp="0" showMasterPhAnim="0">
+  <p:cSld>
+    <p:spTree>
+      <p:nvGrpSpPr>
+        <p:cNvPr id="1" name="Shape 296"/>
+        <p:cNvGrpSpPr/>
+        <p:nvPr/>
+      </p:nvGrpSpPr>
+      <p:grpSpPr>
+        <a:xfrm>
+          <a:off x="0" y="0"/>
+          <a:ext cx="0" cy="0"/>
+          <a:chOff x="0" y="0"/>
+          <a:chExt cx="0" cy="0"/>
+        </a:xfrm>
+      </p:grpSpPr>
+      <p:sp>
+        <p:nvSpPr>
+          <p:cNvPr id="297" name="Google Shape;297;g21c03c1d1e6_1_187:notes"/>
+          <p:cNvSpPr txBox="1">
+            <a:spLocks noGrp="1"/>
+          </p:cNvSpPr>
+          <p:nvPr>
+            <p:ph type="body" idx="1"/>
+          </p:nvPr>
+        </p:nvSpPr>
+        <p:spPr>
+          <a:xfrm>
+            <a:off x="685800" y="4343400"/>
+            <a:ext cx="5486400" cy="4114800"/>
+          </a:xfrm>
+          <a:prstGeom prst="rect">
+            <a:avLst/>
+          </a:prstGeom>
+        </p:spPr>
+        <p:txBody>
+          <a:bodyPr spcFirstLastPara="1" wrap="square" lIns="91425" tIns="91425" rIns="91425" bIns="91425" anchor="t" anchorCtr="0">
+            <a:noAutofit/>
+          </a:bodyPr>
+          <a:lstStyle/>
+          <a:p>
+            <a:pPr marL="0" lvl="0" indent="0" algn="l" rtl="0">
+              <a:spcBef>
+                <a:spcPts val="0"/>
+              </a:spcBef>
+              <a:spcAft>
+                <a:spcPts val="0"/>
+              </a:spcAft>
+              <a:buNone/>
+            </a:pPr>
+            <a:endParaRPr/>
+          </a:p>
+        </p:txBody>
+      </p:sp>
+      <p:sp>
+        <p:nvSpPr>
+          <p:cNvPr id="298" name="Google Shape;298;g21c03c1d1e6_1_187:notes"/>
+          <p:cNvSpPr>
+            <a:spLocks noGrp="1" noRot="1" noChangeAspect="1"/>
+          </p:cNvSpPr>
+          <p:nvPr>
+            <p:ph type="sldImg" idx="2"/>
+          </p:nvPr>
+        </p:nvSpPr>
+        <p:spPr>
+          <a:xfrm>
+            <a:off x="381000" y="685800"/>
+            <a:ext cx="6096000" cy="3429000"/>
+          </a:xfrm>
+          <a:custGeom>
+            <a:avLst/>
+            <a:gdLst/>
+            <a:ahLst/>
+            <a:cxnLst/>
+            <a:rect l="l" t="t" r="r" b="b"/>
+            <a:pathLst>
+              <a:path w="120000" h="120000" extrusionOk="0">
+                <a:moveTo>
+                  <a:pt x="0" y="0"/>
+                </a:moveTo>
+                <a:lnTo>
+                  <a:pt x="120000" y="0"/>
+                </a:lnTo>
+                <a:lnTo>
+                  <a:pt x="120000" y="120000"/>
+                </a:lnTo>
+                <a:lnTo>
+                  <a:pt x="0" y="120000"/>
+                </a:lnTo>
+                <a:close/>
+              </a:path>
+            </a:pathLst>
+          </a:custGeom>
+        </p:spPr>
+      </p:sp>
+    </p:spTree>
+  </p:cSld>
+  <p:clrMapOvr>
+    <a:masterClrMapping/>
+  </p:clrMapOvr>
+</p:notes>
+</file>
+
+<file path=ppt/notesSlides/notesSlide23.xml><?xml version="1.0" encoding="utf-8"?>
+<p:notes xmlns:a="http://schemas.openxmlformats.org/drawingml/2006/main" xmlns:r="http://schemas.openxmlformats.org/officeDocument/2006/relationships" xmlns:p="http://schemas.openxmlformats.org/presentationml/2006/main" showMasterSp="0" showMasterPhAnim="0">
+  <p:cSld>
+    <p:spTree>
+      <p:nvGrpSpPr>
+        <p:cNvPr id="1" name="Shape 241"/>
+        <p:cNvGrpSpPr/>
+        <p:nvPr/>
+      </p:nvGrpSpPr>
+      <p:grpSpPr>
+        <a:xfrm>
+          <a:off x="0" y="0"/>
+          <a:ext cx="0" cy="0"/>
+          <a:chOff x="0" y="0"/>
+          <a:chExt cx="0" cy="0"/>
+        </a:xfrm>
+      </p:grpSpPr>
+      <p:sp>
+        <p:nvSpPr>
+          <p:cNvPr id="242" name="Google Shape;242;g21c03c1d1e6_1_140:notes"/>
+          <p:cNvSpPr txBox="1">
+            <a:spLocks noGrp="1"/>
+          </p:cNvSpPr>
+          <p:nvPr>
+            <p:ph type="body" idx="1"/>
+          </p:nvPr>
+        </p:nvSpPr>
+        <p:spPr>
+          <a:xfrm>
+            <a:off x="685800" y="4343400"/>
+            <a:ext cx="5486400" cy="4114800"/>
+          </a:xfrm>
+          <a:prstGeom prst="rect">
+            <a:avLst/>
+          </a:prstGeom>
+        </p:spPr>
+        <p:txBody>
+          <a:bodyPr spcFirstLastPara="1" wrap="square" lIns="91425" tIns="91425" rIns="91425" bIns="91425" anchor="t" anchorCtr="0">
+            <a:noAutofit/>
+          </a:bodyPr>
+          <a:lstStyle/>
+          <a:p>
+            <a:pPr marL="0" lvl="0" indent="0" algn="l" rtl="0">
+              <a:spcBef>
+                <a:spcPts val="0"/>
+              </a:spcBef>
+              <a:spcAft>
+                <a:spcPts val="0"/>
+              </a:spcAft>
+              <a:buNone/>
+            </a:pPr>
+            <a:endParaRPr/>
+          </a:p>
+        </p:txBody>
+      </p:sp>
+      <p:sp>
+        <p:nvSpPr>
+          <p:cNvPr id="243" name="Google Shape;243;g21c03c1d1e6_1_140:notes"/>
+          <p:cNvSpPr>
+            <a:spLocks noGrp="1" noRot="1" noChangeAspect="1"/>
+          </p:cNvSpPr>
+          <p:nvPr>
+            <p:ph type="sldImg" idx="2"/>
+          </p:nvPr>
+        </p:nvSpPr>
+        <p:spPr>
+          <a:xfrm>
+            <a:off x="381000" y="685800"/>
+            <a:ext cx="6096000" cy="3429000"/>
+          </a:xfrm>
+          <a:custGeom>
+            <a:avLst/>
+            <a:gdLst/>
+            <a:ahLst/>
+            <a:cxnLst/>
+            <a:rect l="l" t="t" r="r" b="b"/>
+            <a:pathLst>
+              <a:path w="120000" h="120000" extrusionOk="0">
+                <a:moveTo>
+                  <a:pt x="0" y="0"/>
+                </a:moveTo>
+                <a:lnTo>
+                  <a:pt x="120000" y="0"/>
+                </a:lnTo>
+                <a:lnTo>
+                  <a:pt x="120000" y="120000"/>
+                </a:lnTo>
+                <a:lnTo>
+                  <a:pt x="0" y="120000"/>
+                </a:lnTo>
+                <a:close/>
+              </a:path>
+            </a:pathLst>
+          </a:custGeom>
+        </p:spPr>
+      </p:sp>
+    </p:spTree>
+  </p:cSld>
+  <p:clrMapOvr>
+    <a:masterClrMapping/>
+  </p:clrMapOvr>
+</p:notes>
+</file>
+
+<file path=ppt/notesSlides/notesSlide24.xml><?xml version="1.0" encoding="utf-8"?>
+<p:notes xmlns:a="http://schemas.openxmlformats.org/drawingml/2006/main" xmlns:r="http://schemas.openxmlformats.org/officeDocument/2006/relationships" xmlns:p="http://schemas.openxmlformats.org/presentationml/2006/main" showMasterSp="0" showMasterPhAnim="0">
+  <p:cSld>
+    <p:spTree>
+      <p:nvGrpSpPr>
         <p:cNvPr id="1" name="Shape 247"/>
         <p:cNvGrpSpPr/>
         <p:nvPr/>
@@ -2480,7 +3108,7 @@
 </p:notes>
 </file>
 
-<file path=ppt/notesSlides/notesSlide21.xml><?xml version="1.0" encoding="utf-8"?>
+<file path=ppt/notesSlides/notesSlide25.xml><?xml version="1.0" encoding="utf-8"?>
 <p:notes xmlns:a="http://schemas.openxmlformats.org/drawingml/2006/main" xmlns:r="http://schemas.openxmlformats.org/officeDocument/2006/relationships" xmlns:p="http://schemas.openxmlformats.org/presentationml/2006/main" showMasterSp="0" showMasterPhAnim="0">
   <p:cSld>
     <p:spTree>
@@ -2584,7 +3212,7 @@
 </p:notes>
 </file>
 
-<file path=ppt/notesSlides/notesSlide22.xml><?xml version="1.0" encoding="utf-8"?>
+<file path=ppt/notesSlides/notesSlide26.xml><?xml version="1.0" encoding="utf-8"?>
 <p:notes xmlns:a="http://schemas.openxmlformats.org/drawingml/2006/main" xmlns:r="http://schemas.openxmlformats.org/officeDocument/2006/relationships" xmlns:p="http://schemas.openxmlformats.org/presentationml/2006/main" showMasterSp="0" showMasterPhAnim="0">
   <p:cSld>
     <p:spTree>
@@ -2688,7 +3316,7 @@
 </p:notes>
 </file>
 
-<file path=ppt/notesSlides/notesSlide23.xml><?xml version="1.0" encoding="utf-8"?>
+<file path=ppt/notesSlides/notesSlide27.xml><?xml version="1.0" encoding="utf-8"?>
 <p:notes xmlns:a="http://schemas.openxmlformats.org/drawingml/2006/main" xmlns:r="http://schemas.openxmlformats.org/officeDocument/2006/relationships" xmlns:p="http://schemas.openxmlformats.org/presentationml/2006/main" showMasterSp="0" showMasterPhAnim="0">
   <p:cSld>
     <p:spTree>
@@ -2792,7 +3420,7 @@
 </p:notes>
 </file>
 
-<file path=ppt/notesSlides/notesSlide24.xml><?xml version="1.0" encoding="utf-8"?>
+<file path=ppt/notesSlides/notesSlide28.xml><?xml version="1.0" encoding="utf-8"?>
 <p:notes xmlns:a="http://schemas.openxmlformats.org/drawingml/2006/main" xmlns:r="http://schemas.openxmlformats.org/officeDocument/2006/relationships" xmlns:p="http://schemas.openxmlformats.org/presentationml/2006/main" showMasterSp="0" showMasterPhAnim="0">
   <p:cSld>
     <p:spTree>
@@ -2859,8 +3487,8 @@
         </p:nvSpPr>
         <p:spPr>
           <a:xfrm>
-            <a:off x="1143225" y="685800"/>
-            <a:ext cx="4572225" cy="3429000"/>
+            <a:off x="381000" y="685800"/>
+            <a:ext cx="6096000" cy="3429000"/>
           </a:xfrm>
           <a:custGeom>
             <a:avLst/>
@@ -2896,7 +3524,7 @@
 </p:notes>
 </file>
 
-<file path=ppt/notesSlides/notesSlide25.xml><?xml version="1.0" encoding="utf-8"?>
+<file path=ppt/notesSlides/notesSlide29.xml><?xml version="1.0" encoding="utf-8"?>
 <p:notes xmlns:a="http://schemas.openxmlformats.org/drawingml/2006/main" xmlns:r="http://schemas.openxmlformats.org/officeDocument/2006/relationships" xmlns:p="http://schemas.openxmlformats.org/presentationml/2006/main" showMasterSp="0" showMasterPhAnim="0">
   <p:cSld>
     <p:spTree>
@@ -2998,422 +3626,6 @@
         <p14:creationId xmlns:p14="http://schemas.microsoft.com/office/powerpoint/2010/main" val="1551990216"/>
       </p:ext>
     </p:extLst>
-  </p:cSld>
-  <p:clrMapOvr>
-    <a:masterClrMapping/>
-  </p:clrMapOvr>
-</p:notes>
-</file>
-
-<file path=ppt/notesSlides/notesSlide26.xml><?xml version="1.0" encoding="utf-8"?>
-<p:notes xmlns:a="http://schemas.openxmlformats.org/drawingml/2006/main" xmlns:r="http://schemas.openxmlformats.org/officeDocument/2006/relationships" xmlns:p="http://schemas.openxmlformats.org/presentationml/2006/main" showMasterSp="0" showMasterPhAnim="0">
-  <p:cSld>
-    <p:spTree>
-      <p:nvGrpSpPr>
-        <p:cNvPr id="1" name="Shape 306"/>
-        <p:cNvGrpSpPr/>
-        <p:nvPr/>
-      </p:nvGrpSpPr>
-      <p:grpSpPr>
-        <a:xfrm>
-          <a:off x="0" y="0"/>
-          <a:ext cx="0" cy="0"/>
-          <a:chOff x="0" y="0"/>
-          <a:chExt cx="0" cy="0"/>
-        </a:xfrm>
-      </p:grpSpPr>
-      <p:sp>
-        <p:nvSpPr>
-          <p:cNvPr id="307" name="Google Shape;307;g21c03c1d1e6_1_196:notes"/>
-          <p:cNvSpPr txBox="1">
-            <a:spLocks noGrp="1"/>
-          </p:cNvSpPr>
-          <p:nvPr>
-            <p:ph type="body" idx="1"/>
-          </p:nvPr>
-        </p:nvSpPr>
-        <p:spPr>
-          <a:xfrm>
-            <a:off x="685800" y="4343400"/>
-            <a:ext cx="5486400" cy="4114800"/>
-          </a:xfrm>
-          <a:prstGeom prst="rect">
-            <a:avLst/>
-          </a:prstGeom>
-        </p:spPr>
-        <p:txBody>
-          <a:bodyPr spcFirstLastPara="1" wrap="square" lIns="91425" tIns="91425" rIns="91425" bIns="91425" anchor="t" anchorCtr="0">
-            <a:noAutofit/>
-          </a:bodyPr>
-          <a:lstStyle/>
-          <a:p>
-            <a:pPr marL="0" lvl="0" indent="0" algn="l" rtl="0">
-              <a:spcBef>
-                <a:spcPts val="0"/>
-              </a:spcBef>
-              <a:spcAft>
-                <a:spcPts val="0"/>
-              </a:spcAft>
-              <a:buNone/>
-            </a:pPr>
-            <a:endParaRPr/>
-          </a:p>
-        </p:txBody>
-      </p:sp>
-      <p:sp>
-        <p:nvSpPr>
-          <p:cNvPr id="308" name="Google Shape;308;g21c03c1d1e6_1_196:notes"/>
-          <p:cNvSpPr>
-            <a:spLocks noGrp="1" noRot="1" noChangeAspect="1"/>
-          </p:cNvSpPr>
-          <p:nvPr>
-            <p:ph type="sldImg" idx="2"/>
-          </p:nvPr>
-        </p:nvSpPr>
-        <p:spPr>
-          <a:xfrm>
-            <a:off x="1143225" y="685800"/>
-            <a:ext cx="4572225" cy="3429000"/>
-          </a:xfrm>
-          <a:custGeom>
-            <a:avLst/>
-            <a:gdLst/>
-            <a:ahLst/>
-            <a:cxnLst/>
-            <a:rect l="l" t="t" r="r" b="b"/>
-            <a:pathLst>
-              <a:path w="120000" h="120000" extrusionOk="0">
-                <a:moveTo>
-                  <a:pt x="0" y="0"/>
-                </a:moveTo>
-                <a:lnTo>
-                  <a:pt x="120000" y="0"/>
-                </a:lnTo>
-                <a:lnTo>
-                  <a:pt x="120000" y="120000"/>
-                </a:lnTo>
-                <a:lnTo>
-                  <a:pt x="0" y="120000"/>
-                </a:lnTo>
-                <a:close/>
-              </a:path>
-            </a:pathLst>
-          </a:custGeom>
-        </p:spPr>
-      </p:sp>
-    </p:spTree>
-  </p:cSld>
-  <p:clrMapOvr>
-    <a:masterClrMapping/>
-  </p:clrMapOvr>
-</p:notes>
-</file>
-
-<file path=ppt/notesSlides/notesSlide27.xml><?xml version="1.0" encoding="utf-8"?>
-<p:notes xmlns:a="http://schemas.openxmlformats.org/drawingml/2006/main" xmlns:r="http://schemas.openxmlformats.org/officeDocument/2006/relationships" xmlns:p="http://schemas.openxmlformats.org/presentationml/2006/main" showMasterSp="0" showMasterPhAnim="0">
-  <p:cSld>
-    <p:spTree>
-      <p:nvGrpSpPr>
-        <p:cNvPr id="1" name="Shape 314"/>
-        <p:cNvGrpSpPr/>
-        <p:nvPr/>
-      </p:nvGrpSpPr>
-      <p:grpSpPr>
-        <a:xfrm>
-          <a:off x="0" y="0"/>
-          <a:ext cx="0" cy="0"/>
-          <a:chOff x="0" y="0"/>
-          <a:chExt cx="0" cy="0"/>
-        </a:xfrm>
-      </p:grpSpPr>
-      <p:sp>
-        <p:nvSpPr>
-          <p:cNvPr id="315" name="Google Shape;315;g21c03c1d1e6_1_202:notes"/>
-          <p:cNvSpPr txBox="1">
-            <a:spLocks noGrp="1"/>
-          </p:cNvSpPr>
-          <p:nvPr>
-            <p:ph type="body" idx="1"/>
-          </p:nvPr>
-        </p:nvSpPr>
-        <p:spPr>
-          <a:xfrm>
-            <a:off x="685800" y="4343400"/>
-            <a:ext cx="5486400" cy="4114800"/>
-          </a:xfrm>
-          <a:prstGeom prst="rect">
-            <a:avLst/>
-          </a:prstGeom>
-        </p:spPr>
-        <p:txBody>
-          <a:bodyPr spcFirstLastPara="1" wrap="square" lIns="91425" tIns="91425" rIns="91425" bIns="91425" anchor="t" anchorCtr="0">
-            <a:noAutofit/>
-          </a:bodyPr>
-          <a:lstStyle/>
-          <a:p>
-            <a:pPr marL="0" lvl="0" indent="0" algn="l" rtl="0">
-              <a:spcBef>
-                <a:spcPts val="0"/>
-              </a:spcBef>
-              <a:spcAft>
-                <a:spcPts val="0"/>
-              </a:spcAft>
-              <a:buNone/>
-            </a:pPr>
-            <a:endParaRPr/>
-          </a:p>
-        </p:txBody>
-      </p:sp>
-      <p:sp>
-        <p:nvSpPr>
-          <p:cNvPr id="316" name="Google Shape;316;g21c03c1d1e6_1_202:notes"/>
-          <p:cNvSpPr>
-            <a:spLocks noGrp="1" noRot="1" noChangeAspect="1"/>
-          </p:cNvSpPr>
-          <p:nvPr>
-            <p:ph type="sldImg" idx="2"/>
-          </p:nvPr>
-        </p:nvSpPr>
-        <p:spPr>
-          <a:xfrm>
-            <a:off x="1143225" y="685800"/>
-            <a:ext cx="4572225" cy="3429000"/>
-          </a:xfrm>
-          <a:custGeom>
-            <a:avLst/>
-            <a:gdLst/>
-            <a:ahLst/>
-            <a:cxnLst/>
-            <a:rect l="l" t="t" r="r" b="b"/>
-            <a:pathLst>
-              <a:path w="120000" h="120000" extrusionOk="0">
-                <a:moveTo>
-                  <a:pt x="0" y="0"/>
-                </a:moveTo>
-                <a:lnTo>
-                  <a:pt x="120000" y="0"/>
-                </a:lnTo>
-                <a:lnTo>
-                  <a:pt x="120000" y="120000"/>
-                </a:lnTo>
-                <a:lnTo>
-                  <a:pt x="0" y="120000"/>
-                </a:lnTo>
-                <a:close/>
-              </a:path>
-            </a:pathLst>
-          </a:custGeom>
-        </p:spPr>
-      </p:sp>
-    </p:spTree>
-  </p:cSld>
-  <p:clrMapOvr>
-    <a:masterClrMapping/>
-  </p:clrMapOvr>
-</p:notes>
-</file>
-
-<file path=ppt/notesSlides/notesSlide28.xml><?xml version="1.0" encoding="utf-8"?>
-<p:notes xmlns:a="http://schemas.openxmlformats.org/drawingml/2006/main" xmlns:r="http://schemas.openxmlformats.org/officeDocument/2006/relationships" xmlns:p="http://schemas.openxmlformats.org/presentationml/2006/main" showMasterSp="0" showMasterPhAnim="0">
-  <p:cSld>
-    <p:spTree>
-      <p:nvGrpSpPr>
-        <p:cNvPr id="1" name="Shape 324"/>
-        <p:cNvGrpSpPr/>
-        <p:nvPr/>
-      </p:nvGrpSpPr>
-      <p:grpSpPr>
-        <a:xfrm>
-          <a:off x="0" y="0"/>
-          <a:ext cx="0" cy="0"/>
-          <a:chOff x="0" y="0"/>
-          <a:chExt cx="0" cy="0"/>
-        </a:xfrm>
-      </p:grpSpPr>
-      <p:sp>
-        <p:nvSpPr>
-          <p:cNvPr id="325" name="Google Shape;325;g21c03c1d1e6_1_210:notes"/>
-          <p:cNvSpPr txBox="1">
-            <a:spLocks noGrp="1"/>
-          </p:cNvSpPr>
-          <p:nvPr>
-            <p:ph type="body" idx="1"/>
-          </p:nvPr>
-        </p:nvSpPr>
-        <p:spPr>
-          <a:xfrm>
-            <a:off x="685800" y="4343400"/>
-            <a:ext cx="5486400" cy="4114800"/>
-          </a:xfrm>
-          <a:prstGeom prst="rect">
-            <a:avLst/>
-          </a:prstGeom>
-        </p:spPr>
-        <p:txBody>
-          <a:bodyPr spcFirstLastPara="1" wrap="square" lIns="91425" tIns="91425" rIns="91425" bIns="91425" anchor="t" anchorCtr="0">
-            <a:noAutofit/>
-          </a:bodyPr>
-          <a:lstStyle/>
-          <a:p>
-            <a:pPr marL="0" lvl="0" indent="0" algn="l" rtl="0">
-              <a:spcBef>
-                <a:spcPts val="0"/>
-              </a:spcBef>
-              <a:spcAft>
-                <a:spcPts val="0"/>
-              </a:spcAft>
-              <a:buNone/>
-            </a:pPr>
-            <a:endParaRPr/>
-          </a:p>
-        </p:txBody>
-      </p:sp>
-      <p:sp>
-        <p:nvSpPr>
-          <p:cNvPr id="326" name="Google Shape;326;g21c03c1d1e6_1_210:notes"/>
-          <p:cNvSpPr>
-            <a:spLocks noGrp="1" noRot="1" noChangeAspect="1"/>
-          </p:cNvSpPr>
-          <p:nvPr>
-            <p:ph type="sldImg" idx="2"/>
-          </p:nvPr>
-        </p:nvSpPr>
-        <p:spPr>
-          <a:xfrm>
-            <a:off x="1143225" y="685800"/>
-            <a:ext cx="4572225" cy="3429000"/>
-          </a:xfrm>
-          <a:custGeom>
-            <a:avLst/>
-            <a:gdLst/>
-            <a:ahLst/>
-            <a:cxnLst/>
-            <a:rect l="l" t="t" r="r" b="b"/>
-            <a:pathLst>
-              <a:path w="120000" h="120000" extrusionOk="0">
-                <a:moveTo>
-                  <a:pt x="0" y="0"/>
-                </a:moveTo>
-                <a:lnTo>
-                  <a:pt x="120000" y="0"/>
-                </a:lnTo>
-                <a:lnTo>
-                  <a:pt x="120000" y="120000"/>
-                </a:lnTo>
-                <a:lnTo>
-                  <a:pt x="0" y="120000"/>
-                </a:lnTo>
-                <a:close/>
-              </a:path>
-            </a:pathLst>
-          </a:custGeom>
-        </p:spPr>
-      </p:sp>
-    </p:spTree>
-  </p:cSld>
-  <p:clrMapOvr>
-    <a:masterClrMapping/>
-  </p:clrMapOvr>
-</p:notes>
-</file>
-
-<file path=ppt/notesSlides/notesSlide29.xml><?xml version="1.0" encoding="utf-8"?>
-<p:notes xmlns:a="http://schemas.openxmlformats.org/drawingml/2006/main" xmlns:r="http://schemas.openxmlformats.org/officeDocument/2006/relationships" xmlns:p="http://schemas.openxmlformats.org/presentationml/2006/main" showMasterSp="0" showMasterPhAnim="0">
-  <p:cSld>
-    <p:spTree>
-      <p:nvGrpSpPr>
-        <p:cNvPr id="1" name="Shape 334"/>
-        <p:cNvGrpSpPr/>
-        <p:nvPr/>
-      </p:nvGrpSpPr>
-      <p:grpSpPr>
-        <a:xfrm>
-          <a:off x="0" y="0"/>
-          <a:ext cx="0" cy="0"/>
-          <a:chOff x="0" y="0"/>
-          <a:chExt cx="0" cy="0"/>
-        </a:xfrm>
-      </p:grpSpPr>
-      <p:sp>
-        <p:nvSpPr>
-          <p:cNvPr id="335" name="Google Shape;335;g21c03c1d1e6_1_219:notes"/>
-          <p:cNvSpPr txBox="1">
-            <a:spLocks noGrp="1"/>
-          </p:cNvSpPr>
-          <p:nvPr>
-            <p:ph type="body" idx="1"/>
-          </p:nvPr>
-        </p:nvSpPr>
-        <p:spPr>
-          <a:xfrm>
-            <a:off x="685800" y="4343400"/>
-            <a:ext cx="5486400" cy="4114800"/>
-          </a:xfrm>
-          <a:prstGeom prst="rect">
-            <a:avLst/>
-          </a:prstGeom>
-        </p:spPr>
-        <p:txBody>
-          <a:bodyPr spcFirstLastPara="1" wrap="square" lIns="91425" tIns="91425" rIns="91425" bIns="91425" anchor="t" anchorCtr="0">
-            <a:noAutofit/>
-          </a:bodyPr>
-          <a:lstStyle/>
-          <a:p>
-            <a:pPr marL="0" lvl="0" indent="0" algn="l" rtl="0">
-              <a:spcBef>
-                <a:spcPts val="0"/>
-              </a:spcBef>
-              <a:spcAft>
-                <a:spcPts val="0"/>
-              </a:spcAft>
-              <a:buNone/>
-            </a:pPr>
-            <a:endParaRPr/>
-          </a:p>
-        </p:txBody>
-      </p:sp>
-      <p:sp>
-        <p:nvSpPr>
-          <p:cNvPr id="336" name="Google Shape;336;g21c03c1d1e6_1_219:notes"/>
-          <p:cNvSpPr>
-            <a:spLocks noGrp="1" noRot="1" noChangeAspect="1"/>
-          </p:cNvSpPr>
-          <p:nvPr>
-            <p:ph type="sldImg" idx="2"/>
-          </p:nvPr>
-        </p:nvSpPr>
-        <p:spPr>
-          <a:xfrm>
-            <a:off x="1143225" y="685800"/>
-            <a:ext cx="4572225" cy="3429000"/>
-          </a:xfrm>
-          <a:custGeom>
-            <a:avLst/>
-            <a:gdLst/>
-            <a:ahLst/>
-            <a:cxnLst/>
-            <a:rect l="l" t="t" r="r" b="b"/>
-            <a:pathLst>
-              <a:path w="120000" h="120000" extrusionOk="0">
-                <a:moveTo>
-                  <a:pt x="0" y="0"/>
-                </a:moveTo>
-                <a:lnTo>
-                  <a:pt x="120000" y="0"/>
-                </a:lnTo>
-                <a:lnTo>
-                  <a:pt x="120000" y="120000"/>
-                </a:lnTo>
-                <a:lnTo>
-                  <a:pt x="0" y="120000"/>
-                </a:lnTo>
-                <a:close/>
-              </a:path>
-            </a:pathLst>
-          </a:custGeom>
-        </p:spPr>
-      </p:sp>
-    </p:spTree>
   </p:cSld>
   <p:clrMapOvr>
     <a:masterClrMapping/>
@@ -3530,6 +3742,422 @@
   <p:cSld>
     <p:spTree>
       <p:nvGrpSpPr>
+        <p:cNvPr id="1" name="Shape 306"/>
+        <p:cNvGrpSpPr/>
+        <p:nvPr/>
+      </p:nvGrpSpPr>
+      <p:grpSpPr>
+        <a:xfrm>
+          <a:off x="0" y="0"/>
+          <a:ext cx="0" cy="0"/>
+          <a:chOff x="0" y="0"/>
+          <a:chExt cx="0" cy="0"/>
+        </a:xfrm>
+      </p:grpSpPr>
+      <p:sp>
+        <p:nvSpPr>
+          <p:cNvPr id="307" name="Google Shape;307;g21c03c1d1e6_1_196:notes"/>
+          <p:cNvSpPr txBox="1">
+            <a:spLocks noGrp="1"/>
+          </p:cNvSpPr>
+          <p:nvPr>
+            <p:ph type="body" idx="1"/>
+          </p:nvPr>
+        </p:nvSpPr>
+        <p:spPr>
+          <a:xfrm>
+            <a:off x="685800" y="4343400"/>
+            <a:ext cx="5486400" cy="4114800"/>
+          </a:xfrm>
+          <a:prstGeom prst="rect">
+            <a:avLst/>
+          </a:prstGeom>
+        </p:spPr>
+        <p:txBody>
+          <a:bodyPr spcFirstLastPara="1" wrap="square" lIns="91425" tIns="91425" rIns="91425" bIns="91425" anchor="t" anchorCtr="0">
+            <a:noAutofit/>
+          </a:bodyPr>
+          <a:lstStyle/>
+          <a:p>
+            <a:pPr marL="0" lvl="0" indent="0" algn="l" rtl="0">
+              <a:spcBef>
+                <a:spcPts val="0"/>
+              </a:spcBef>
+              <a:spcAft>
+                <a:spcPts val="0"/>
+              </a:spcAft>
+              <a:buNone/>
+            </a:pPr>
+            <a:endParaRPr/>
+          </a:p>
+        </p:txBody>
+      </p:sp>
+      <p:sp>
+        <p:nvSpPr>
+          <p:cNvPr id="308" name="Google Shape;308;g21c03c1d1e6_1_196:notes"/>
+          <p:cNvSpPr>
+            <a:spLocks noGrp="1" noRot="1" noChangeAspect="1"/>
+          </p:cNvSpPr>
+          <p:nvPr>
+            <p:ph type="sldImg" idx="2"/>
+          </p:nvPr>
+        </p:nvSpPr>
+        <p:spPr>
+          <a:xfrm>
+            <a:off x="1143225" y="685800"/>
+            <a:ext cx="4572225" cy="3429000"/>
+          </a:xfrm>
+          <a:custGeom>
+            <a:avLst/>
+            <a:gdLst/>
+            <a:ahLst/>
+            <a:cxnLst/>
+            <a:rect l="l" t="t" r="r" b="b"/>
+            <a:pathLst>
+              <a:path w="120000" h="120000" extrusionOk="0">
+                <a:moveTo>
+                  <a:pt x="0" y="0"/>
+                </a:moveTo>
+                <a:lnTo>
+                  <a:pt x="120000" y="0"/>
+                </a:lnTo>
+                <a:lnTo>
+                  <a:pt x="120000" y="120000"/>
+                </a:lnTo>
+                <a:lnTo>
+                  <a:pt x="0" y="120000"/>
+                </a:lnTo>
+                <a:close/>
+              </a:path>
+            </a:pathLst>
+          </a:custGeom>
+        </p:spPr>
+      </p:sp>
+    </p:spTree>
+  </p:cSld>
+  <p:clrMapOvr>
+    <a:masterClrMapping/>
+  </p:clrMapOvr>
+</p:notes>
+</file>
+
+<file path=ppt/notesSlides/notesSlide31.xml><?xml version="1.0" encoding="utf-8"?>
+<p:notes xmlns:a="http://schemas.openxmlformats.org/drawingml/2006/main" xmlns:r="http://schemas.openxmlformats.org/officeDocument/2006/relationships" xmlns:p="http://schemas.openxmlformats.org/presentationml/2006/main" showMasterSp="0" showMasterPhAnim="0">
+  <p:cSld>
+    <p:spTree>
+      <p:nvGrpSpPr>
+        <p:cNvPr id="1" name="Shape 314"/>
+        <p:cNvGrpSpPr/>
+        <p:nvPr/>
+      </p:nvGrpSpPr>
+      <p:grpSpPr>
+        <a:xfrm>
+          <a:off x="0" y="0"/>
+          <a:ext cx="0" cy="0"/>
+          <a:chOff x="0" y="0"/>
+          <a:chExt cx="0" cy="0"/>
+        </a:xfrm>
+      </p:grpSpPr>
+      <p:sp>
+        <p:nvSpPr>
+          <p:cNvPr id="315" name="Google Shape;315;g21c03c1d1e6_1_202:notes"/>
+          <p:cNvSpPr txBox="1">
+            <a:spLocks noGrp="1"/>
+          </p:cNvSpPr>
+          <p:nvPr>
+            <p:ph type="body" idx="1"/>
+          </p:nvPr>
+        </p:nvSpPr>
+        <p:spPr>
+          <a:xfrm>
+            <a:off x="685800" y="4343400"/>
+            <a:ext cx="5486400" cy="4114800"/>
+          </a:xfrm>
+          <a:prstGeom prst="rect">
+            <a:avLst/>
+          </a:prstGeom>
+        </p:spPr>
+        <p:txBody>
+          <a:bodyPr spcFirstLastPara="1" wrap="square" lIns="91425" tIns="91425" rIns="91425" bIns="91425" anchor="t" anchorCtr="0">
+            <a:noAutofit/>
+          </a:bodyPr>
+          <a:lstStyle/>
+          <a:p>
+            <a:pPr marL="0" lvl="0" indent="0" algn="l" rtl="0">
+              <a:spcBef>
+                <a:spcPts val="0"/>
+              </a:spcBef>
+              <a:spcAft>
+                <a:spcPts val="0"/>
+              </a:spcAft>
+              <a:buNone/>
+            </a:pPr>
+            <a:endParaRPr/>
+          </a:p>
+        </p:txBody>
+      </p:sp>
+      <p:sp>
+        <p:nvSpPr>
+          <p:cNvPr id="316" name="Google Shape;316;g21c03c1d1e6_1_202:notes"/>
+          <p:cNvSpPr>
+            <a:spLocks noGrp="1" noRot="1" noChangeAspect="1"/>
+          </p:cNvSpPr>
+          <p:nvPr>
+            <p:ph type="sldImg" idx="2"/>
+          </p:nvPr>
+        </p:nvSpPr>
+        <p:spPr>
+          <a:xfrm>
+            <a:off x="1143225" y="685800"/>
+            <a:ext cx="4572225" cy="3429000"/>
+          </a:xfrm>
+          <a:custGeom>
+            <a:avLst/>
+            <a:gdLst/>
+            <a:ahLst/>
+            <a:cxnLst/>
+            <a:rect l="l" t="t" r="r" b="b"/>
+            <a:pathLst>
+              <a:path w="120000" h="120000" extrusionOk="0">
+                <a:moveTo>
+                  <a:pt x="0" y="0"/>
+                </a:moveTo>
+                <a:lnTo>
+                  <a:pt x="120000" y="0"/>
+                </a:lnTo>
+                <a:lnTo>
+                  <a:pt x="120000" y="120000"/>
+                </a:lnTo>
+                <a:lnTo>
+                  <a:pt x="0" y="120000"/>
+                </a:lnTo>
+                <a:close/>
+              </a:path>
+            </a:pathLst>
+          </a:custGeom>
+        </p:spPr>
+      </p:sp>
+    </p:spTree>
+  </p:cSld>
+  <p:clrMapOvr>
+    <a:masterClrMapping/>
+  </p:clrMapOvr>
+</p:notes>
+</file>
+
+<file path=ppt/notesSlides/notesSlide32.xml><?xml version="1.0" encoding="utf-8"?>
+<p:notes xmlns:a="http://schemas.openxmlformats.org/drawingml/2006/main" xmlns:r="http://schemas.openxmlformats.org/officeDocument/2006/relationships" xmlns:p="http://schemas.openxmlformats.org/presentationml/2006/main" showMasterSp="0" showMasterPhAnim="0">
+  <p:cSld>
+    <p:spTree>
+      <p:nvGrpSpPr>
+        <p:cNvPr id="1" name="Shape 324"/>
+        <p:cNvGrpSpPr/>
+        <p:nvPr/>
+      </p:nvGrpSpPr>
+      <p:grpSpPr>
+        <a:xfrm>
+          <a:off x="0" y="0"/>
+          <a:ext cx="0" cy="0"/>
+          <a:chOff x="0" y="0"/>
+          <a:chExt cx="0" cy="0"/>
+        </a:xfrm>
+      </p:grpSpPr>
+      <p:sp>
+        <p:nvSpPr>
+          <p:cNvPr id="325" name="Google Shape;325;g21c03c1d1e6_1_210:notes"/>
+          <p:cNvSpPr txBox="1">
+            <a:spLocks noGrp="1"/>
+          </p:cNvSpPr>
+          <p:nvPr>
+            <p:ph type="body" idx="1"/>
+          </p:nvPr>
+        </p:nvSpPr>
+        <p:spPr>
+          <a:xfrm>
+            <a:off x="685800" y="4343400"/>
+            <a:ext cx="5486400" cy="4114800"/>
+          </a:xfrm>
+          <a:prstGeom prst="rect">
+            <a:avLst/>
+          </a:prstGeom>
+        </p:spPr>
+        <p:txBody>
+          <a:bodyPr spcFirstLastPara="1" wrap="square" lIns="91425" tIns="91425" rIns="91425" bIns="91425" anchor="t" anchorCtr="0">
+            <a:noAutofit/>
+          </a:bodyPr>
+          <a:lstStyle/>
+          <a:p>
+            <a:pPr marL="0" lvl="0" indent="0" algn="l" rtl="0">
+              <a:spcBef>
+                <a:spcPts val="0"/>
+              </a:spcBef>
+              <a:spcAft>
+                <a:spcPts val="0"/>
+              </a:spcAft>
+              <a:buNone/>
+            </a:pPr>
+            <a:endParaRPr/>
+          </a:p>
+        </p:txBody>
+      </p:sp>
+      <p:sp>
+        <p:nvSpPr>
+          <p:cNvPr id="326" name="Google Shape;326;g21c03c1d1e6_1_210:notes"/>
+          <p:cNvSpPr>
+            <a:spLocks noGrp="1" noRot="1" noChangeAspect="1"/>
+          </p:cNvSpPr>
+          <p:nvPr>
+            <p:ph type="sldImg" idx="2"/>
+          </p:nvPr>
+        </p:nvSpPr>
+        <p:spPr>
+          <a:xfrm>
+            <a:off x="1143225" y="685800"/>
+            <a:ext cx="4572225" cy="3429000"/>
+          </a:xfrm>
+          <a:custGeom>
+            <a:avLst/>
+            <a:gdLst/>
+            <a:ahLst/>
+            <a:cxnLst/>
+            <a:rect l="l" t="t" r="r" b="b"/>
+            <a:pathLst>
+              <a:path w="120000" h="120000" extrusionOk="0">
+                <a:moveTo>
+                  <a:pt x="0" y="0"/>
+                </a:moveTo>
+                <a:lnTo>
+                  <a:pt x="120000" y="0"/>
+                </a:lnTo>
+                <a:lnTo>
+                  <a:pt x="120000" y="120000"/>
+                </a:lnTo>
+                <a:lnTo>
+                  <a:pt x="0" y="120000"/>
+                </a:lnTo>
+                <a:close/>
+              </a:path>
+            </a:pathLst>
+          </a:custGeom>
+        </p:spPr>
+      </p:sp>
+    </p:spTree>
+  </p:cSld>
+  <p:clrMapOvr>
+    <a:masterClrMapping/>
+  </p:clrMapOvr>
+</p:notes>
+</file>
+
+<file path=ppt/notesSlides/notesSlide33.xml><?xml version="1.0" encoding="utf-8"?>
+<p:notes xmlns:a="http://schemas.openxmlformats.org/drawingml/2006/main" xmlns:r="http://schemas.openxmlformats.org/officeDocument/2006/relationships" xmlns:p="http://schemas.openxmlformats.org/presentationml/2006/main" showMasterSp="0" showMasterPhAnim="0">
+  <p:cSld>
+    <p:spTree>
+      <p:nvGrpSpPr>
+        <p:cNvPr id="1" name="Shape 334"/>
+        <p:cNvGrpSpPr/>
+        <p:nvPr/>
+      </p:nvGrpSpPr>
+      <p:grpSpPr>
+        <a:xfrm>
+          <a:off x="0" y="0"/>
+          <a:ext cx="0" cy="0"/>
+          <a:chOff x="0" y="0"/>
+          <a:chExt cx="0" cy="0"/>
+        </a:xfrm>
+      </p:grpSpPr>
+      <p:sp>
+        <p:nvSpPr>
+          <p:cNvPr id="335" name="Google Shape;335;g21c03c1d1e6_1_219:notes"/>
+          <p:cNvSpPr txBox="1">
+            <a:spLocks noGrp="1"/>
+          </p:cNvSpPr>
+          <p:nvPr>
+            <p:ph type="body" idx="1"/>
+          </p:nvPr>
+        </p:nvSpPr>
+        <p:spPr>
+          <a:xfrm>
+            <a:off x="685800" y="4343400"/>
+            <a:ext cx="5486400" cy="4114800"/>
+          </a:xfrm>
+          <a:prstGeom prst="rect">
+            <a:avLst/>
+          </a:prstGeom>
+        </p:spPr>
+        <p:txBody>
+          <a:bodyPr spcFirstLastPara="1" wrap="square" lIns="91425" tIns="91425" rIns="91425" bIns="91425" anchor="t" anchorCtr="0">
+            <a:noAutofit/>
+          </a:bodyPr>
+          <a:lstStyle/>
+          <a:p>
+            <a:pPr marL="0" lvl="0" indent="0" algn="l" rtl="0">
+              <a:spcBef>
+                <a:spcPts val="0"/>
+              </a:spcBef>
+              <a:spcAft>
+                <a:spcPts val="0"/>
+              </a:spcAft>
+              <a:buNone/>
+            </a:pPr>
+            <a:endParaRPr/>
+          </a:p>
+        </p:txBody>
+      </p:sp>
+      <p:sp>
+        <p:nvSpPr>
+          <p:cNvPr id="336" name="Google Shape;336;g21c03c1d1e6_1_219:notes"/>
+          <p:cNvSpPr>
+            <a:spLocks noGrp="1" noRot="1" noChangeAspect="1"/>
+          </p:cNvSpPr>
+          <p:nvPr>
+            <p:ph type="sldImg" idx="2"/>
+          </p:nvPr>
+        </p:nvSpPr>
+        <p:spPr>
+          <a:xfrm>
+            <a:off x="1143225" y="685800"/>
+            <a:ext cx="4572225" cy="3429000"/>
+          </a:xfrm>
+          <a:custGeom>
+            <a:avLst/>
+            <a:gdLst/>
+            <a:ahLst/>
+            <a:cxnLst/>
+            <a:rect l="l" t="t" r="r" b="b"/>
+            <a:pathLst>
+              <a:path w="120000" h="120000" extrusionOk="0">
+                <a:moveTo>
+                  <a:pt x="0" y="0"/>
+                </a:moveTo>
+                <a:lnTo>
+                  <a:pt x="120000" y="0"/>
+                </a:lnTo>
+                <a:lnTo>
+                  <a:pt x="120000" y="120000"/>
+                </a:lnTo>
+                <a:lnTo>
+                  <a:pt x="0" y="120000"/>
+                </a:lnTo>
+                <a:close/>
+              </a:path>
+            </a:pathLst>
+          </a:custGeom>
+        </p:spPr>
+      </p:sp>
+    </p:spTree>
+  </p:cSld>
+  <p:clrMapOvr>
+    <a:masterClrMapping/>
+  </p:clrMapOvr>
+</p:notes>
+</file>
+
+<file path=ppt/notesSlides/notesSlide34.xml><?xml version="1.0" encoding="utf-8"?>
+<p:notes xmlns:a="http://schemas.openxmlformats.org/drawingml/2006/main" xmlns:r="http://schemas.openxmlformats.org/officeDocument/2006/relationships" xmlns:p="http://schemas.openxmlformats.org/presentationml/2006/main" showMasterSp="0" showMasterPhAnim="0">
+  <p:cSld>
+    <p:spTree>
+      <p:nvGrpSpPr>
         <p:cNvPr id="1" name="Shape 346"/>
         <p:cNvGrpSpPr/>
         <p:nvPr/>
@@ -3629,7 +4257,7 @@
 </p:notes>
 </file>
 
-<file path=ppt/notesSlides/notesSlide31.xml><?xml version="1.0" encoding="utf-8"?>
+<file path=ppt/notesSlides/notesSlide35.xml><?xml version="1.0" encoding="utf-8"?>
 <p:notes xmlns:a="http://schemas.openxmlformats.org/drawingml/2006/main" xmlns:r="http://schemas.openxmlformats.org/officeDocument/2006/relationships" xmlns:p="http://schemas.openxmlformats.org/presentationml/2006/main" showMasterSp="0" showMasterPhAnim="0">
   <p:cSld>
     <p:spTree>
@@ -3733,7 +4361,7 @@
 </p:notes>
 </file>
 
-<file path=ppt/notesSlides/notesSlide32.xml><?xml version="1.0" encoding="utf-8"?>
+<file path=ppt/notesSlides/notesSlide36.xml><?xml version="1.0" encoding="utf-8"?>
 <p:notes xmlns:a="http://schemas.openxmlformats.org/drawingml/2006/main" xmlns:r="http://schemas.openxmlformats.org/officeDocument/2006/relationships" xmlns:p="http://schemas.openxmlformats.org/presentationml/2006/main" showMasterSp="0" showMasterPhAnim="0">
   <p:cSld>
     <p:spTree>
@@ -3837,7 +4465,7 @@
 </p:notes>
 </file>
 
-<file path=ppt/notesSlides/notesSlide33.xml><?xml version="1.0" encoding="utf-8"?>
+<file path=ppt/notesSlides/notesSlide37.xml><?xml version="1.0" encoding="utf-8"?>
 <p:notes xmlns:a="http://schemas.openxmlformats.org/drawingml/2006/main" xmlns:r="http://schemas.openxmlformats.org/officeDocument/2006/relationships" xmlns:p="http://schemas.openxmlformats.org/presentationml/2006/main" showMasterSp="0" showMasterPhAnim="0">
   <p:cSld>
     <p:spTree>
@@ -3941,7 +4569,7 @@
 </p:notes>
 </file>
 
-<file path=ppt/notesSlides/notesSlide34.xml><?xml version="1.0" encoding="utf-8"?>
+<file path=ppt/notesSlides/notesSlide38.xml><?xml version="1.0" encoding="utf-8"?>
 <p:notes xmlns:a="http://schemas.openxmlformats.org/drawingml/2006/main" xmlns:r="http://schemas.openxmlformats.org/officeDocument/2006/relationships" xmlns:p="http://schemas.openxmlformats.org/presentationml/2006/main" showMasterSp="0" showMasterPhAnim="0">
   <p:cSld>
     <p:spTree>
@@ -4045,7 +4673,7 @@
 </p:notes>
 </file>
 
-<file path=ppt/notesSlides/notesSlide35.xml><?xml version="1.0" encoding="utf-8"?>
+<file path=ppt/notesSlides/notesSlide39.xml><?xml version="1.0" encoding="utf-8"?>
 <p:notes xmlns:a="http://schemas.openxmlformats.org/drawingml/2006/main" xmlns:r="http://schemas.openxmlformats.org/officeDocument/2006/relationships" xmlns:p="http://schemas.openxmlformats.org/presentationml/2006/main" showMasterSp="0" showMasterPhAnim="0">
   <p:cSld>
     <p:spTree>
@@ -20306,6 +20934,1219 @@
   <p:cSld>
     <p:spTree>
       <p:nvGrpSpPr>
+        <p:cNvPr id="1" name="Shape 226"/>
+        <p:cNvGrpSpPr/>
+        <p:nvPr/>
+      </p:nvGrpSpPr>
+      <p:grpSpPr>
+        <a:xfrm>
+          <a:off x="0" y="0"/>
+          <a:ext cx="0" cy="0"/>
+          <a:chOff x="0" y="0"/>
+          <a:chExt cx="0" cy="0"/>
+        </a:xfrm>
+      </p:grpSpPr>
+      <p:sp>
+        <p:nvSpPr>
+          <p:cNvPr id="227" name="Google Shape;227;g21c03c1d1e6_1_126"/>
+          <p:cNvSpPr txBox="1"/>
+          <p:nvPr/>
+        </p:nvSpPr>
+        <p:spPr>
+          <a:xfrm>
+            <a:off x="222160" y="0"/>
+            <a:ext cx="8770513" cy="608527"/>
+          </a:xfrm>
+          <a:prstGeom prst="rect">
+            <a:avLst/>
+          </a:prstGeom>
+          <a:noFill/>
+          <a:ln>
+            <a:noFill/>
+          </a:ln>
+        </p:spPr>
+        <p:txBody>
+          <a:bodyPr spcFirstLastPara="1" wrap="square" lIns="68575" tIns="34275" rIns="68575" bIns="34275" anchor="t" anchorCtr="0">
+            <a:noAutofit/>
+          </a:bodyPr>
+          <a:lstStyle/>
+          <a:p>
+            <a:pPr marL="0" marR="0" lvl="0" indent="0" algn="ctr" rtl="0">
+              <a:lnSpc>
+                <a:spcPct val="120000"/>
+              </a:lnSpc>
+              <a:spcBef>
+                <a:spcPts val="0"/>
+              </a:spcBef>
+              <a:spcAft>
+                <a:spcPts val="0"/>
+              </a:spcAft>
+              <a:buClr>
+                <a:schemeClr val="dk1"/>
+              </a:buClr>
+              <a:buSzPts val="3000"/>
+              <a:buFont typeface="Arial"/>
+              <a:buNone/>
+            </a:pPr>
+            <a:r>
+              <a:rPr lang="en" sz="2400">
+                <a:solidFill>
+                  <a:schemeClr val="dk1"/>
+                </a:solidFill>
+                <a:latin typeface="Twentieth Century"/>
+                <a:ea typeface="Twentieth Century"/>
+                <a:cs typeface="Twentieth Century"/>
+                <a:sym typeface="Twentieth Century"/>
+              </a:rPr>
+              <a:t>Recurrent Neural Network (RNN)</a:t>
+            </a:r>
+            <a:endParaRPr sz="1100"/>
+          </a:p>
+        </p:txBody>
+      </p:sp>
+      <p:sp>
+        <p:nvSpPr>
+          <p:cNvPr id="231" name="Google Shape;231;g21c03c1d1e6_1_126"/>
+          <p:cNvSpPr txBox="1">
+            <a:spLocks noGrp="1"/>
+          </p:cNvSpPr>
+          <p:nvPr>
+            <p:ph type="title"/>
+          </p:nvPr>
+        </p:nvSpPr>
+        <p:spPr>
+          <a:xfrm>
+            <a:off x="98250" y="16350"/>
+            <a:ext cx="8826600" cy="602700"/>
+          </a:xfrm>
+          <a:prstGeom prst="rect">
+            <a:avLst/>
+          </a:prstGeom>
+        </p:spPr>
+        <p:txBody>
+          <a:bodyPr spcFirstLastPara="1" wrap="square" lIns="91425" tIns="91425" rIns="91425" bIns="91425" anchor="ctr" anchorCtr="0">
+            <a:normAutofit/>
+          </a:bodyPr>
+          <a:lstStyle/>
+          <a:p>
+            <a:pPr marL="0" lvl="0" indent="0" algn="l" rtl="0">
+              <a:spcBef>
+                <a:spcPts val="0"/>
+              </a:spcBef>
+              <a:spcAft>
+                <a:spcPts val="0"/>
+              </a:spcAft>
+              <a:buNone/>
+            </a:pPr>
+            <a:r>
+              <a:rPr lang="en"/>
+              <a:t>Redes recurrentes - Back propagation through time (BPTT)</a:t>
+            </a:r>
+            <a:endParaRPr/>
+          </a:p>
+        </p:txBody>
+      </p:sp>
+      <p:pic>
+        <p:nvPicPr>
+          <p:cNvPr id="3" name="Imagen 2">
+            <a:extLst>
+              <a:ext uri="{FF2B5EF4-FFF2-40B4-BE49-F238E27FC236}">
+                <a16:creationId xmlns:a16="http://schemas.microsoft.com/office/drawing/2014/main" id="{8F1DAAD6-642B-8E32-7DA6-4C42DEB7AE84}"/>
+              </a:ext>
+            </a:extLst>
+          </p:cNvPr>
+          <p:cNvPicPr>
+            <a:picLocks noChangeAspect="1"/>
+          </p:cNvPicPr>
+          <p:nvPr/>
+        </p:nvPicPr>
+        <p:blipFill>
+          <a:blip r:embed="rId3"/>
+          <a:stretch>
+            <a:fillRect/>
+          </a:stretch>
+        </p:blipFill>
+        <p:spPr>
+          <a:xfrm>
+            <a:off x="1024567" y="743184"/>
+            <a:ext cx="6820387" cy="4185662"/>
+          </a:xfrm>
+          <a:prstGeom prst="rect">
+            <a:avLst/>
+          </a:prstGeom>
+        </p:spPr>
+      </p:pic>
+    </p:spTree>
+    <p:extLst>
+      <p:ext uri="{BB962C8B-B14F-4D97-AF65-F5344CB8AC3E}">
+        <p14:creationId xmlns:p14="http://schemas.microsoft.com/office/powerpoint/2010/main" val="3137623413"/>
+      </p:ext>
+    </p:extLst>
+  </p:cSld>
+  <p:clrMapOvr>
+    <a:masterClrMapping/>
+  </p:clrMapOvr>
+</p:sld>
+</file>
+
+<file path=ppt/slides/slide18.xml><?xml version="1.0" encoding="utf-8"?>
+<p:sld xmlns:a="http://schemas.openxmlformats.org/drawingml/2006/main" xmlns:r="http://schemas.openxmlformats.org/officeDocument/2006/relationships" xmlns:p="http://schemas.openxmlformats.org/presentationml/2006/main">
+  <p:cSld>
+    <p:spTree>
+      <p:nvGrpSpPr>
+        <p:cNvPr id="1" name="Shape 226"/>
+        <p:cNvGrpSpPr/>
+        <p:nvPr/>
+      </p:nvGrpSpPr>
+      <p:grpSpPr>
+        <a:xfrm>
+          <a:off x="0" y="0"/>
+          <a:ext cx="0" cy="0"/>
+          <a:chOff x="0" y="0"/>
+          <a:chExt cx="0" cy="0"/>
+        </a:xfrm>
+      </p:grpSpPr>
+      <p:sp>
+        <p:nvSpPr>
+          <p:cNvPr id="227" name="Google Shape;227;g21c03c1d1e6_1_126"/>
+          <p:cNvSpPr txBox="1"/>
+          <p:nvPr/>
+        </p:nvSpPr>
+        <p:spPr>
+          <a:xfrm>
+            <a:off x="222160" y="0"/>
+            <a:ext cx="8770513" cy="608527"/>
+          </a:xfrm>
+          <a:prstGeom prst="rect">
+            <a:avLst/>
+          </a:prstGeom>
+          <a:noFill/>
+          <a:ln>
+            <a:noFill/>
+          </a:ln>
+        </p:spPr>
+        <p:txBody>
+          <a:bodyPr spcFirstLastPara="1" wrap="square" lIns="68575" tIns="34275" rIns="68575" bIns="34275" anchor="t" anchorCtr="0">
+            <a:noAutofit/>
+          </a:bodyPr>
+          <a:lstStyle/>
+          <a:p>
+            <a:pPr marL="0" marR="0" lvl="0" indent="0" algn="ctr" rtl="0">
+              <a:lnSpc>
+                <a:spcPct val="120000"/>
+              </a:lnSpc>
+              <a:spcBef>
+                <a:spcPts val="0"/>
+              </a:spcBef>
+              <a:spcAft>
+                <a:spcPts val="0"/>
+              </a:spcAft>
+              <a:buClr>
+                <a:schemeClr val="dk1"/>
+              </a:buClr>
+              <a:buSzPts val="3000"/>
+              <a:buFont typeface="Arial"/>
+              <a:buNone/>
+            </a:pPr>
+            <a:r>
+              <a:rPr lang="en" sz="2400">
+                <a:solidFill>
+                  <a:schemeClr val="dk1"/>
+                </a:solidFill>
+                <a:latin typeface="Twentieth Century"/>
+                <a:ea typeface="Twentieth Century"/>
+                <a:cs typeface="Twentieth Century"/>
+                <a:sym typeface="Twentieth Century"/>
+              </a:rPr>
+              <a:t>Recurrent Neural Network (RNN)</a:t>
+            </a:r>
+            <a:endParaRPr sz="1100"/>
+          </a:p>
+        </p:txBody>
+      </p:sp>
+      <p:sp>
+        <p:nvSpPr>
+          <p:cNvPr id="231" name="Google Shape;231;g21c03c1d1e6_1_126"/>
+          <p:cNvSpPr txBox="1">
+            <a:spLocks noGrp="1"/>
+          </p:cNvSpPr>
+          <p:nvPr>
+            <p:ph type="title"/>
+          </p:nvPr>
+        </p:nvSpPr>
+        <p:spPr>
+          <a:xfrm>
+            <a:off x="98250" y="16350"/>
+            <a:ext cx="8826600" cy="602700"/>
+          </a:xfrm>
+          <a:prstGeom prst="rect">
+            <a:avLst/>
+          </a:prstGeom>
+        </p:spPr>
+        <p:txBody>
+          <a:bodyPr spcFirstLastPara="1" wrap="square" lIns="91425" tIns="91425" rIns="91425" bIns="91425" anchor="ctr" anchorCtr="0">
+            <a:normAutofit/>
+          </a:bodyPr>
+          <a:lstStyle/>
+          <a:p>
+            <a:pPr marL="0" lvl="0" indent="0" algn="l" rtl="0">
+              <a:spcBef>
+                <a:spcPts val="0"/>
+              </a:spcBef>
+              <a:spcAft>
+                <a:spcPts val="0"/>
+              </a:spcAft>
+              <a:buNone/>
+            </a:pPr>
+            <a:r>
+              <a:rPr lang="en"/>
+              <a:t>Redes recurrentes - Back propagation through time (BPTT)</a:t>
+            </a:r>
+            <a:endParaRPr/>
+          </a:p>
+        </p:txBody>
+      </p:sp>
+      <p:pic>
+        <p:nvPicPr>
+          <p:cNvPr id="3" name="Imagen 2">
+            <a:extLst>
+              <a:ext uri="{FF2B5EF4-FFF2-40B4-BE49-F238E27FC236}">
+                <a16:creationId xmlns:a16="http://schemas.microsoft.com/office/drawing/2014/main" id="{9D03D3F5-78BB-F2CD-C53D-8B1DBEE3127E}"/>
+              </a:ext>
+            </a:extLst>
+          </p:cNvPr>
+          <p:cNvPicPr>
+            <a:picLocks noChangeAspect="1"/>
+          </p:cNvPicPr>
+          <p:nvPr/>
+        </p:nvPicPr>
+        <p:blipFill>
+          <a:blip r:embed="rId3"/>
+          <a:stretch>
+            <a:fillRect/>
+          </a:stretch>
+        </p:blipFill>
+        <p:spPr>
+          <a:xfrm>
+            <a:off x="222160" y="1183753"/>
+            <a:ext cx="3003975" cy="1127278"/>
+          </a:xfrm>
+          <a:prstGeom prst="rect">
+            <a:avLst/>
+          </a:prstGeom>
+        </p:spPr>
+      </p:pic>
+      <p:pic>
+        <p:nvPicPr>
+          <p:cNvPr id="5" name="Imagen 4">
+            <a:extLst>
+              <a:ext uri="{FF2B5EF4-FFF2-40B4-BE49-F238E27FC236}">
+                <a16:creationId xmlns:a16="http://schemas.microsoft.com/office/drawing/2014/main" id="{110F3932-C008-1E37-1FF6-D1612E5685BF}"/>
+              </a:ext>
+            </a:extLst>
+          </p:cNvPr>
+          <p:cNvPicPr>
+            <a:picLocks noChangeAspect="1"/>
+          </p:cNvPicPr>
+          <p:nvPr/>
+        </p:nvPicPr>
+        <p:blipFill>
+          <a:blip r:embed="rId4"/>
+          <a:stretch>
+            <a:fillRect/>
+          </a:stretch>
+        </p:blipFill>
+        <p:spPr>
+          <a:xfrm>
+            <a:off x="3816984" y="1159608"/>
+            <a:ext cx="4638403" cy="2302846"/>
+          </a:xfrm>
+          <a:prstGeom prst="rect">
+            <a:avLst/>
+          </a:prstGeom>
+        </p:spPr>
+      </p:pic>
+      <p:pic>
+        <p:nvPicPr>
+          <p:cNvPr id="7" name="Imagen 6">
+            <a:extLst>
+              <a:ext uri="{FF2B5EF4-FFF2-40B4-BE49-F238E27FC236}">
+                <a16:creationId xmlns:a16="http://schemas.microsoft.com/office/drawing/2014/main" id="{B086223D-3C92-320C-FDA4-2986A3EC8B24}"/>
+              </a:ext>
+            </a:extLst>
+          </p:cNvPr>
+          <p:cNvPicPr>
+            <a:picLocks noChangeAspect="1"/>
+          </p:cNvPicPr>
+          <p:nvPr/>
+        </p:nvPicPr>
+        <p:blipFill>
+          <a:blip r:embed="rId5"/>
+          <a:stretch>
+            <a:fillRect/>
+          </a:stretch>
+        </p:blipFill>
+        <p:spPr>
+          <a:xfrm>
+            <a:off x="1008416" y="3557727"/>
+            <a:ext cx="7127167" cy="1384236"/>
+          </a:xfrm>
+          <a:prstGeom prst="rect">
+            <a:avLst/>
+          </a:prstGeom>
+        </p:spPr>
+      </p:pic>
+    </p:spTree>
+    <p:extLst>
+      <p:ext uri="{BB962C8B-B14F-4D97-AF65-F5344CB8AC3E}">
+        <p14:creationId xmlns:p14="http://schemas.microsoft.com/office/powerpoint/2010/main" val="4139229005"/>
+      </p:ext>
+    </p:extLst>
+  </p:cSld>
+  <p:clrMapOvr>
+    <a:masterClrMapping/>
+  </p:clrMapOvr>
+</p:sld>
+</file>
+
+<file path=ppt/slides/slide19.xml><?xml version="1.0" encoding="utf-8"?>
+<p:sld xmlns:a="http://schemas.openxmlformats.org/drawingml/2006/main" xmlns:r="http://schemas.openxmlformats.org/officeDocument/2006/relationships" xmlns:p="http://schemas.openxmlformats.org/presentationml/2006/main">
+  <p:cSld>
+    <p:spTree>
+      <p:nvGrpSpPr>
+        <p:cNvPr id="1" name="Shape 226"/>
+        <p:cNvGrpSpPr/>
+        <p:nvPr/>
+      </p:nvGrpSpPr>
+      <p:grpSpPr>
+        <a:xfrm>
+          <a:off x="0" y="0"/>
+          <a:ext cx="0" cy="0"/>
+          <a:chOff x="0" y="0"/>
+          <a:chExt cx="0" cy="0"/>
+        </a:xfrm>
+      </p:grpSpPr>
+      <p:sp>
+        <p:nvSpPr>
+          <p:cNvPr id="227" name="Google Shape;227;g21c03c1d1e6_1_126"/>
+          <p:cNvSpPr txBox="1"/>
+          <p:nvPr/>
+        </p:nvSpPr>
+        <p:spPr>
+          <a:xfrm>
+            <a:off x="222160" y="0"/>
+            <a:ext cx="8770513" cy="608527"/>
+          </a:xfrm>
+          <a:prstGeom prst="rect">
+            <a:avLst/>
+          </a:prstGeom>
+          <a:noFill/>
+          <a:ln>
+            <a:noFill/>
+          </a:ln>
+        </p:spPr>
+        <p:txBody>
+          <a:bodyPr spcFirstLastPara="1" wrap="square" lIns="68575" tIns="34275" rIns="68575" bIns="34275" anchor="t" anchorCtr="0">
+            <a:noAutofit/>
+          </a:bodyPr>
+          <a:lstStyle/>
+          <a:p>
+            <a:pPr marL="0" marR="0" lvl="0" indent="0" algn="ctr" rtl="0">
+              <a:lnSpc>
+                <a:spcPct val="120000"/>
+              </a:lnSpc>
+              <a:spcBef>
+                <a:spcPts val="0"/>
+              </a:spcBef>
+              <a:spcAft>
+                <a:spcPts val="0"/>
+              </a:spcAft>
+              <a:buClr>
+                <a:schemeClr val="dk1"/>
+              </a:buClr>
+              <a:buSzPts val="3000"/>
+              <a:buFont typeface="Arial"/>
+              <a:buNone/>
+            </a:pPr>
+            <a:r>
+              <a:rPr lang="en" sz="2400">
+                <a:solidFill>
+                  <a:schemeClr val="dk1"/>
+                </a:solidFill>
+                <a:latin typeface="Twentieth Century"/>
+                <a:ea typeface="Twentieth Century"/>
+                <a:cs typeface="Twentieth Century"/>
+                <a:sym typeface="Twentieth Century"/>
+              </a:rPr>
+              <a:t>Recurrent Neural Network (RNN)</a:t>
+            </a:r>
+            <a:endParaRPr sz="1100"/>
+          </a:p>
+        </p:txBody>
+      </p:sp>
+      <p:sp>
+        <p:nvSpPr>
+          <p:cNvPr id="231" name="Google Shape;231;g21c03c1d1e6_1_126"/>
+          <p:cNvSpPr txBox="1">
+            <a:spLocks noGrp="1"/>
+          </p:cNvSpPr>
+          <p:nvPr>
+            <p:ph type="title"/>
+          </p:nvPr>
+        </p:nvSpPr>
+        <p:spPr>
+          <a:xfrm>
+            <a:off x="98250" y="16350"/>
+            <a:ext cx="8826600" cy="602700"/>
+          </a:xfrm>
+          <a:prstGeom prst="rect">
+            <a:avLst/>
+          </a:prstGeom>
+        </p:spPr>
+        <p:txBody>
+          <a:bodyPr spcFirstLastPara="1" wrap="square" lIns="91425" tIns="91425" rIns="91425" bIns="91425" anchor="ctr" anchorCtr="0">
+            <a:normAutofit/>
+          </a:bodyPr>
+          <a:lstStyle/>
+          <a:p>
+            <a:pPr marL="0" lvl="0" indent="0" algn="l" rtl="0">
+              <a:spcBef>
+                <a:spcPts val="0"/>
+              </a:spcBef>
+              <a:spcAft>
+                <a:spcPts val="0"/>
+              </a:spcAft>
+              <a:buNone/>
+            </a:pPr>
+            <a:r>
+              <a:rPr lang="en"/>
+              <a:t>Redes recurrentes - Back propagation through time (BPTT)</a:t>
+            </a:r>
+            <a:endParaRPr/>
+          </a:p>
+        </p:txBody>
+      </p:sp>
+      <p:pic>
+        <p:nvPicPr>
+          <p:cNvPr id="3" name="Imagen 2">
+            <a:extLst>
+              <a:ext uri="{FF2B5EF4-FFF2-40B4-BE49-F238E27FC236}">
+                <a16:creationId xmlns:a16="http://schemas.microsoft.com/office/drawing/2014/main" id="{07F6C8A2-6E4B-CC35-FBCA-FE785C2AC540}"/>
+              </a:ext>
+            </a:extLst>
+          </p:cNvPr>
+          <p:cNvPicPr>
+            <a:picLocks noChangeAspect="1"/>
+          </p:cNvPicPr>
+          <p:nvPr/>
+        </p:nvPicPr>
+        <p:blipFill>
+          <a:blip r:embed="rId3"/>
+          <a:stretch>
+            <a:fillRect/>
+          </a:stretch>
+        </p:blipFill>
+        <p:spPr>
+          <a:xfrm>
+            <a:off x="222160" y="885652"/>
+            <a:ext cx="4733925" cy="485775"/>
+          </a:xfrm>
+          <a:prstGeom prst="rect">
+            <a:avLst/>
+          </a:prstGeom>
+        </p:spPr>
+      </p:pic>
+      <p:pic>
+        <p:nvPicPr>
+          <p:cNvPr id="7" name="Imagen 6">
+            <a:extLst>
+              <a:ext uri="{FF2B5EF4-FFF2-40B4-BE49-F238E27FC236}">
+                <a16:creationId xmlns:a16="http://schemas.microsoft.com/office/drawing/2014/main" id="{E9CEA9F8-4C91-6372-E31C-322AD64E5DF3}"/>
+              </a:ext>
+            </a:extLst>
+          </p:cNvPr>
+          <p:cNvPicPr>
+            <a:picLocks noChangeAspect="1"/>
+          </p:cNvPicPr>
+          <p:nvPr/>
+        </p:nvPicPr>
+        <p:blipFill>
+          <a:blip r:embed="rId4"/>
+          <a:stretch>
+            <a:fillRect/>
+          </a:stretch>
+        </p:blipFill>
+        <p:spPr>
+          <a:xfrm>
+            <a:off x="4344981" y="885652"/>
+            <a:ext cx="4377049" cy="2134819"/>
+          </a:xfrm>
+          <a:prstGeom prst="rect">
+            <a:avLst/>
+          </a:prstGeom>
+        </p:spPr>
+      </p:pic>
+      <p:pic>
+        <p:nvPicPr>
+          <p:cNvPr id="9" name="Imagen 8">
+            <a:extLst>
+              <a:ext uri="{FF2B5EF4-FFF2-40B4-BE49-F238E27FC236}">
+                <a16:creationId xmlns:a16="http://schemas.microsoft.com/office/drawing/2014/main" id="{6F1E6A7D-9012-4072-5AB5-CCB5A5C9F10B}"/>
+              </a:ext>
+            </a:extLst>
+          </p:cNvPr>
+          <p:cNvPicPr>
+            <a:picLocks noChangeAspect="1"/>
+          </p:cNvPicPr>
+          <p:nvPr/>
+        </p:nvPicPr>
+        <p:blipFill>
+          <a:blip r:embed="rId5"/>
+          <a:stretch>
+            <a:fillRect/>
+          </a:stretch>
+        </p:blipFill>
+        <p:spPr>
+          <a:xfrm>
+            <a:off x="914485" y="3102531"/>
+            <a:ext cx="7194129" cy="1916269"/>
+          </a:xfrm>
+          <a:prstGeom prst="rect">
+            <a:avLst/>
+          </a:prstGeom>
+        </p:spPr>
+      </p:pic>
+    </p:spTree>
+    <p:extLst>
+      <p:ext uri="{BB962C8B-B14F-4D97-AF65-F5344CB8AC3E}">
+        <p14:creationId xmlns:p14="http://schemas.microsoft.com/office/powerpoint/2010/main" val="3179616302"/>
+      </p:ext>
+    </p:extLst>
+  </p:cSld>
+  <p:clrMapOvr>
+    <a:masterClrMapping/>
+  </p:clrMapOvr>
+</p:sld>
+</file>
+
+<file path=ppt/slides/slide2.xml><?xml version="1.0" encoding="utf-8"?>
+<p:sld xmlns:a="http://schemas.openxmlformats.org/drawingml/2006/main" xmlns:r="http://schemas.openxmlformats.org/officeDocument/2006/relationships" xmlns:p="http://schemas.openxmlformats.org/presentationml/2006/main">
+  <p:cSld>
+    <p:spTree>
+      <p:nvGrpSpPr>
+        <p:cNvPr id="1" name="Shape 80"/>
+        <p:cNvGrpSpPr/>
+        <p:nvPr/>
+      </p:nvGrpSpPr>
+      <p:grpSpPr>
+        <a:xfrm>
+          <a:off x="0" y="0"/>
+          <a:ext cx="0" cy="0"/>
+          <a:chOff x="0" y="0"/>
+          <a:chExt cx="0" cy="0"/>
+        </a:xfrm>
+      </p:grpSpPr>
+      <p:sp>
+        <p:nvSpPr>
+          <p:cNvPr id="81" name="Google Shape;81;p2"/>
+          <p:cNvSpPr txBox="1">
+            <a:spLocks noGrp="1"/>
+          </p:cNvSpPr>
+          <p:nvPr>
+            <p:ph type="title"/>
+          </p:nvPr>
+        </p:nvSpPr>
+        <p:spPr>
+          <a:xfrm>
+            <a:off x="471900" y="174125"/>
+            <a:ext cx="8222100" cy="1332300"/>
+          </a:xfrm>
+          <a:prstGeom prst="rect">
+            <a:avLst/>
+          </a:prstGeom>
+          <a:noFill/>
+          <a:ln>
+            <a:noFill/>
+          </a:ln>
+        </p:spPr>
+        <p:txBody>
+          <a:bodyPr spcFirstLastPara="1" wrap="square" lIns="91425" tIns="91425" rIns="91425" bIns="91425" anchor="b" anchorCtr="0">
+            <a:noAutofit/>
+          </a:bodyPr>
+          <a:lstStyle/>
+          <a:p>
+            <a:pPr marL="0" lvl="0" indent="0" algn="ctr" rtl="0">
+              <a:lnSpc>
+                <a:spcPct val="120000"/>
+              </a:lnSpc>
+              <a:spcBef>
+                <a:spcPts val="1000"/>
+              </a:spcBef>
+              <a:spcAft>
+                <a:spcPts val="0"/>
+              </a:spcAft>
+              <a:buSzPts val="990"/>
+              <a:buNone/>
+            </a:pPr>
+            <a:r>
+              <a:rPr lang="en" sz="2818">
+                <a:latin typeface="Arial"/>
+                <a:ea typeface="Arial"/>
+                <a:cs typeface="Arial"/>
+                <a:sym typeface="Arial"/>
+              </a:rPr>
+              <a:t>Redes Recurrentes</a:t>
+            </a:r>
+            <a:endParaRPr sz="2818">
+              <a:latin typeface="Arial"/>
+              <a:ea typeface="Arial"/>
+              <a:cs typeface="Arial"/>
+              <a:sym typeface="Arial"/>
+            </a:endParaRPr>
+          </a:p>
+          <a:p>
+            <a:pPr marL="0" lvl="0" indent="0" algn="ctr" rtl="0">
+              <a:lnSpc>
+                <a:spcPct val="120000"/>
+              </a:lnSpc>
+              <a:spcBef>
+                <a:spcPts val="1000"/>
+              </a:spcBef>
+              <a:spcAft>
+                <a:spcPts val="0"/>
+              </a:spcAft>
+              <a:buSzPts val="990"/>
+              <a:buNone/>
+            </a:pPr>
+            <a:r>
+              <a:rPr lang="en" sz="2818">
+                <a:latin typeface="Arial"/>
+                <a:ea typeface="Arial"/>
+                <a:cs typeface="Arial"/>
+                <a:sym typeface="Arial"/>
+              </a:rPr>
+              <a:t>Recurrent Neural Network (RNN)</a:t>
+            </a:r>
+            <a:endParaRPr sz="2208"/>
+          </a:p>
+        </p:txBody>
+      </p:sp>
+      <p:sp>
+        <p:nvSpPr>
+          <p:cNvPr id="82" name="Google Shape;82;p2"/>
+          <p:cNvSpPr txBox="1">
+            <a:spLocks noGrp="1"/>
+          </p:cNvSpPr>
+          <p:nvPr>
+            <p:ph type="body" idx="1"/>
+          </p:nvPr>
+        </p:nvSpPr>
+        <p:spPr>
+          <a:xfrm>
+            <a:off x="471900" y="1986025"/>
+            <a:ext cx="3358800" cy="3050400"/>
+          </a:xfrm>
+          <a:prstGeom prst="rect">
+            <a:avLst/>
+          </a:prstGeom>
+          <a:noFill/>
+          <a:ln>
+            <a:noFill/>
+          </a:ln>
+        </p:spPr>
+        <p:txBody>
+          <a:bodyPr spcFirstLastPara="1" wrap="square" lIns="91425" tIns="91425" rIns="91425" bIns="91425" anchor="t" anchorCtr="0">
+            <a:noAutofit/>
+          </a:bodyPr>
+          <a:lstStyle/>
+          <a:p>
+            <a:pPr marL="0" lvl="0" indent="0" algn="l" rtl="0">
+              <a:lnSpc>
+                <a:spcPct val="95000"/>
+              </a:lnSpc>
+              <a:spcBef>
+                <a:spcPts val="0"/>
+              </a:spcBef>
+              <a:spcAft>
+                <a:spcPts val="0"/>
+              </a:spcAft>
+              <a:buSzPts val="1018"/>
+              <a:buNone/>
+            </a:pPr>
+            <a:r>
+              <a:rPr lang="en">
+                <a:solidFill>
+                  <a:schemeClr val="dk2"/>
+                </a:solidFill>
+              </a:rPr>
+              <a:t>. Introducción</a:t>
+            </a:r>
+            <a:endParaRPr>
+              <a:solidFill>
+                <a:schemeClr val="dk2"/>
+              </a:solidFill>
+            </a:endParaRPr>
+          </a:p>
+          <a:p>
+            <a:pPr marL="0" lvl="0" indent="0" algn="l" rtl="0">
+              <a:lnSpc>
+                <a:spcPct val="95000"/>
+              </a:lnSpc>
+              <a:spcBef>
+                <a:spcPts val="1200"/>
+              </a:spcBef>
+              <a:spcAft>
+                <a:spcPts val="0"/>
+              </a:spcAft>
+              <a:buSzPts val="1018"/>
+              <a:buNone/>
+            </a:pPr>
+            <a:r>
+              <a:rPr lang="en">
+                <a:solidFill>
+                  <a:schemeClr val="dk2"/>
+                </a:solidFill>
+              </a:rPr>
+              <a:t>. Neurona recurrente básica</a:t>
+            </a:r>
+            <a:endParaRPr>
+              <a:solidFill>
+                <a:schemeClr val="dk2"/>
+              </a:solidFill>
+            </a:endParaRPr>
+          </a:p>
+          <a:p>
+            <a:pPr marL="0" lvl="0" indent="0" algn="l" rtl="0">
+              <a:lnSpc>
+                <a:spcPct val="95000"/>
+              </a:lnSpc>
+              <a:spcBef>
+                <a:spcPts val="1200"/>
+              </a:spcBef>
+              <a:spcAft>
+                <a:spcPts val="0"/>
+              </a:spcAft>
+              <a:buSzPts val="1018"/>
+              <a:buNone/>
+            </a:pPr>
+            <a:r>
+              <a:rPr lang="en">
+                <a:solidFill>
+                  <a:schemeClr val="dk2"/>
+                </a:solidFill>
+              </a:rPr>
+              <a:t>. Implementación en pytorch</a:t>
+            </a:r>
+            <a:endParaRPr>
+              <a:solidFill>
+                <a:schemeClr val="dk2"/>
+              </a:solidFill>
+            </a:endParaRPr>
+          </a:p>
+          <a:p>
+            <a:pPr marL="0" lvl="0" indent="0" algn="l" rtl="0">
+              <a:lnSpc>
+                <a:spcPct val="95000"/>
+              </a:lnSpc>
+              <a:spcBef>
+                <a:spcPts val="1200"/>
+              </a:spcBef>
+              <a:spcAft>
+                <a:spcPts val="0"/>
+              </a:spcAft>
+              <a:buSzPts val="1018"/>
+              <a:buNone/>
+            </a:pPr>
+            <a:r>
+              <a:rPr lang="en">
+                <a:solidFill>
+                  <a:schemeClr val="dk2"/>
+                </a:solidFill>
+              </a:rPr>
+              <a:t>. Back propagation through time (BPTT)</a:t>
+            </a:r>
+            <a:endParaRPr>
+              <a:solidFill>
+                <a:schemeClr val="dk2"/>
+              </a:solidFill>
+            </a:endParaRPr>
+          </a:p>
+        </p:txBody>
+      </p:sp>
+      <p:pic>
+        <p:nvPicPr>
+          <p:cNvPr id="83" name="Google Shape;83;p2"/>
+          <p:cNvPicPr preferRelativeResize="0"/>
+          <p:nvPr/>
+        </p:nvPicPr>
+        <p:blipFill rotWithShape="1">
+          <a:blip r:embed="rId3">
+            <a:alphaModFix/>
+          </a:blip>
+          <a:srcRect/>
+          <a:stretch/>
+        </p:blipFill>
+        <p:spPr>
+          <a:xfrm>
+            <a:off x="8130475" y="4138900"/>
+            <a:ext cx="790275" cy="790275"/>
+          </a:xfrm>
+          <a:prstGeom prst="rect">
+            <a:avLst/>
+          </a:prstGeom>
+          <a:noFill/>
+          <a:ln>
+            <a:noFill/>
+          </a:ln>
+        </p:spPr>
+      </p:pic>
+      <p:sp>
+        <p:nvSpPr>
+          <p:cNvPr id="84" name="Google Shape;84;p2"/>
+          <p:cNvSpPr txBox="1">
+            <a:spLocks noGrp="1"/>
+          </p:cNvSpPr>
+          <p:nvPr>
+            <p:ph type="body" idx="1"/>
+          </p:nvPr>
+        </p:nvSpPr>
+        <p:spPr>
+          <a:xfrm>
+            <a:off x="4070850" y="1928300"/>
+            <a:ext cx="4100100" cy="3050400"/>
+          </a:xfrm>
+          <a:prstGeom prst="rect">
+            <a:avLst/>
+          </a:prstGeom>
+          <a:noFill/>
+          <a:ln>
+            <a:noFill/>
+          </a:ln>
+        </p:spPr>
+        <p:txBody>
+          <a:bodyPr spcFirstLastPara="1" wrap="square" lIns="91425" tIns="91425" rIns="91425" bIns="91425" anchor="t" anchorCtr="0">
+            <a:normAutofit/>
+          </a:bodyPr>
+          <a:lstStyle/>
+          <a:p>
+            <a:pPr marL="0" lvl="0" indent="0" algn="l" rtl="0">
+              <a:lnSpc>
+                <a:spcPct val="115000"/>
+              </a:lnSpc>
+              <a:spcBef>
+                <a:spcPts val="0"/>
+              </a:spcBef>
+              <a:spcAft>
+                <a:spcPts val="0"/>
+              </a:spcAft>
+              <a:buSzPts val="1800"/>
+              <a:buNone/>
+            </a:pPr>
+            <a:r>
+              <a:rPr lang="en">
+                <a:solidFill>
+                  <a:schemeClr val="dk2"/>
+                </a:solidFill>
+              </a:rPr>
+              <a:t>. Birideccionalidad </a:t>
+            </a:r>
+            <a:endParaRPr>
+              <a:solidFill>
+                <a:schemeClr val="dk2"/>
+              </a:solidFill>
+            </a:endParaRPr>
+          </a:p>
+          <a:p>
+            <a:pPr marL="0" lvl="0" indent="0" algn="l" rtl="0">
+              <a:lnSpc>
+                <a:spcPct val="115000"/>
+              </a:lnSpc>
+              <a:spcBef>
+                <a:spcPts val="1200"/>
+              </a:spcBef>
+              <a:spcAft>
+                <a:spcPts val="0"/>
+              </a:spcAft>
+              <a:buSzPts val="1800"/>
+              <a:buNone/>
+            </a:pPr>
+            <a:r>
+              <a:rPr lang="en">
+                <a:solidFill>
+                  <a:schemeClr val="dk2"/>
+                </a:solidFill>
+              </a:rPr>
+              <a:t>. Arquitectura enconder-decoder (seq to seq)</a:t>
+            </a:r>
+            <a:endParaRPr>
+              <a:solidFill>
+                <a:schemeClr val="dk2"/>
+              </a:solidFill>
+            </a:endParaRPr>
+          </a:p>
+          <a:p>
+            <a:pPr marL="0" lvl="0" indent="0" algn="l" rtl="0">
+              <a:lnSpc>
+                <a:spcPct val="115000"/>
+              </a:lnSpc>
+              <a:spcBef>
+                <a:spcPts val="1200"/>
+              </a:spcBef>
+              <a:spcAft>
+                <a:spcPts val="0"/>
+              </a:spcAft>
+              <a:buSzPts val="1800"/>
+              <a:buNone/>
+            </a:pPr>
+            <a:r>
+              <a:rPr lang="en">
+                <a:solidFill>
+                  <a:schemeClr val="dk2"/>
+                </a:solidFill>
+              </a:rPr>
+              <a:t>. Mecanismos de atención</a:t>
+            </a:r>
+            <a:endParaRPr>
+              <a:solidFill>
+                <a:schemeClr val="dk2"/>
+              </a:solidFill>
+            </a:endParaRPr>
+          </a:p>
+        </p:txBody>
+      </p:sp>
+    </p:spTree>
+  </p:cSld>
+  <p:clrMapOvr>
+    <a:masterClrMapping/>
+  </p:clrMapOvr>
+</p:sld>
+</file>
+
+<file path=ppt/slides/slide20.xml><?xml version="1.0" encoding="utf-8"?>
+<p:sld xmlns:a="http://schemas.openxmlformats.org/drawingml/2006/main" xmlns:r="http://schemas.openxmlformats.org/officeDocument/2006/relationships" xmlns:p="http://schemas.openxmlformats.org/presentationml/2006/main">
+  <p:cSld>
+    <p:spTree>
+      <p:nvGrpSpPr>
+        <p:cNvPr id="1" name="Shape 226"/>
+        <p:cNvGrpSpPr/>
+        <p:nvPr/>
+      </p:nvGrpSpPr>
+      <p:grpSpPr>
+        <a:xfrm>
+          <a:off x="0" y="0"/>
+          <a:ext cx="0" cy="0"/>
+          <a:chOff x="0" y="0"/>
+          <a:chExt cx="0" cy="0"/>
+        </a:xfrm>
+      </p:grpSpPr>
+      <p:sp>
+        <p:nvSpPr>
+          <p:cNvPr id="227" name="Google Shape;227;g21c03c1d1e6_1_126"/>
+          <p:cNvSpPr txBox="1"/>
+          <p:nvPr/>
+        </p:nvSpPr>
+        <p:spPr>
+          <a:xfrm>
+            <a:off x="222160" y="0"/>
+            <a:ext cx="8770513" cy="608527"/>
+          </a:xfrm>
+          <a:prstGeom prst="rect">
+            <a:avLst/>
+          </a:prstGeom>
+          <a:noFill/>
+          <a:ln>
+            <a:noFill/>
+          </a:ln>
+        </p:spPr>
+        <p:txBody>
+          <a:bodyPr spcFirstLastPara="1" wrap="square" lIns="68575" tIns="34275" rIns="68575" bIns="34275" anchor="t" anchorCtr="0">
+            <a:noAutofit/>
+          </a:bodyPr>
+          <a:lstStyle/>
+          <a:p>
+            <a:pPr marL="0" marR="0" lvl="0" indent="0" algn="ctr" rtl="0">
+              <a:lnSpc>
+                <a:spcPct val="120000"/>
+              </a:lnSpc>
+              <a:spcBef>
+                <a:spcPts val="0"/>
+              </a:spcBef>
+              <a:spcAft>
+                <a:spcPts val="0"/>
+              </a:spcAft>
+              <a:buClr>
+                <a:schemeClr val="dk1"/>
+              </a:buClr>
+              <a:buSzPts val="3000"/>
+              <a:buFont typeface="Arial"/>
+              <a:buNone/>
+            </a:pPr>
+            <a:r>
+              <a:rPr lang="en" sz="2400">
+                <a:solidFill>
+                  <a:schemeClr val="dk1"/>
+                </a:solidFill>
+                <a:latin typeface="Twentieth Century"/>
+                <a:ea typeface="Twentieth Century"/>
+                <a:cs typeface="Twentieth Century"/>
+                <a:sym typeface="Twentieth Century"/>
+              </a:rPr>
+              <a:t>Recurrent Neural Network (RNN)</a:t>
+            </a:r>
+            <a:endParaRPr sz="1100"/>
+          </a:p>
+        </p:txBody>
+      </p:sp>
+      <p:sp>
+        <p:nvSpPr>
+          <p:cNvPr id="231" name="Google Shape;231;g21c03c1d1e6_1_126"/>
+          <p:cNvSpPr txBox="1">
+            <a:spLocks noGrp="1"/>
+          </p:cNvSpPr>
+          <p:nvPr>
+            <p:ph type="title"/>
+          </p:nvPr>
+        </p:nvSpPr>
+        <p:spPr>
+          <a:xfrm>
+            <a:off x="98250" y="16350"/>
+            <a:ext cx="8826600" cy="602700"/>
+          </a:xfrm>
+          <a:prstGeom prst="rect">
+            <a:avLst/>
+          </a:prstGeom>
+        </p:spPr>
+        <p:txBody>
+          <a:bodyPr spcFirstLastPara="1" wrap="square" lIns="91425" tIns="91425" rIns="91425" bIns="91425" anchor="ctr" anchorCtr="0">
+            <a:normAutofit/>
+          </a:bodyPr>
+          <a:lstStyle/>
+          <a:p>
+            <a:pPr marL="0" lvl="0" indent="0" algn="l" rtl="0">
+              <a:spcBef>
+                <a:spcPts val="0"/>
+              </a:spcBef>
+              <a:spcAft>
+                <a:spcPts val="0"/>
+              </a:spcAft>
+              <a:buNone/>
+            </a:pPr>
+            <a:r>
+              <a:rPr lang="en"/>
+              <a:t>Redes recurrentes - Back propagation through time (BPTT)</a:t>
+            </a:r>
+            <a:endParaRPr/>
+          </a:p>
+        </p:txBody>
+      </p:sp>
+      <p:pic>
+        <p:nvPicPr>
+          <p:cNvPr id="4" name="Imagen 3">
+            <a:extLst>
+              <a:ext uri="{FF2B5EF4-FFF2-40B4-BE49-F238E27FC236}">
+                <a16:creationId xmlns:a16="http://schemas.microsoft.com/office/drawing/2014/main" id="{B1E56B2D-1A7E-B595-8FDB-6BA836414150}"/>
+              </a:ext>
+            </a:extLst>
+          </p:cNvPr>
+          <p:cNvPicPr>
+            <a:picLocks noChangeAspect="1"/>
+          </p:cNvPicPr>
+          <p:nvPr/>
+        </p:nvPicPr>
+        <p:blipFill>
+          <a:blip r:embed="rId3"/>
+          <a:stretch>
+            <a:fillRect/>
+          </a:stretch>
+        </p:blipFill>
+        <p:spPr>
+          <a:xfrm>
+            <a:off x="222160" y="844856"/>
+            <a:ext cx="3343275" cy="457200"/>
+          </a:xfrm>
+          <a:prstGeom prst="rect">
+            <a:avLst/>
+          </a:prstGeom>
+        </p:spPr>
+      </p:pic>
+      <p:pic>
+        <p:nvPicPr>
+          <p:cNvPr id="6" name="Imagen 5">
+            <a:extLst>
+              <a:ext uri="{FF2B5EF4-FFF2-40B4-BE49-F238E27FC236}">
+                <a16:creationId xmlns:a16="http://schemas.microsoft.com/office/drawing/2014/main" id="{3B87B3A4-251A-0315-F9EE-DAD61ADCB9DF}"/>
+              </a:ext>
+            </a:extLst>
+          </p:cNvPr>
+          <p:cNvPicPr>
+            <a:picLocks noChangeAspect="1"/>
+          </p:cNvPicPr>
+          <p:nvPr/>
+        </p:nvPicPr>
+        <p:blipFill>
+          <a:blip r:embed="rId4"/>
+          <a:stretch>
+            <a:fillRect/>
+          </a:stretch>
+        </p:blipFill>
+        <p:spPr>
+          <a:xfrm>
+            <a:off x="4146641" y="954899"/>
+            <a:ext cx="4611769" cy="2176646"/>
+          </a:xfrm>
+          <a:prstGeom prst="rect">
+            <a:avLst/>
+          </a:prstGeom>
+        </p:spPr>
+      </p:pic>
+      <p:pic>
+        <p:nvPicPr>
+          <p:cNvPr id="10" name="Imagen 9">
+            <a:extLst>
+              <a:ext uri="{FF2B5EF4-FFF2-40B4-BE49-F238E27FC236}">
+                <a16:creationId xmlns:a16="http://schemas.microsoft.com/office/drawing/2014/main" id="{21ECE62E-087E-6FA4-B8E1-ECB992A69997}"/>
+              </a:ext>
+            </a:extLst>
+          </p:cNvPr>
+          <p:cNvPicPr>
+            <a:picLocks noChangeAspect="1"/>
+          </p:cNvPicPr>
+          <p:nvPr/>
+        </p:nvPicPr>
+        <p:blipFill>
+          <a:blip r:embed="rId5"/>
+          <a:stretch>
+            <a:fillRect/>
+          </a:stretch>
+        </p:blipFill>
+        <p:spPr>
+          <a:xfrm>
+            <a:off x="1039529" y="3131545"/>
+            <a:ext cx="7135774" cy="1891021"/>
+          </a:xfrm>
+          <a:prstGeom prst="rect">
+            <a:avLst/>
+          </a:prstGeom>
+        </p:spPr>
+      </p:pic>
+    </p:spTree>
+    <p:extLst>
+      <p:ext uri="{BB962C8B-B14F-4D97-AF65-F5344CB8AC3E}">
+        <p14:creationId xmlns:p14="http://schemas.microsoft.com/office/powerpoint/2010/main" val="1421602177"/>
+      </p:ext>
+    </p:extLst>
+  </p:cSld>
+  <p:clrMapOvr>
+    <a:masterClrMapping/>
+  </p:clrMapOvr>
+</p:sld>
+</file>
+
+<file path=ppt/slides/slide21.xml><?xml version="1.0" encoding="utf-8"?>
+<p:sld xmlns:a="http://schemas.openxmlformats.org/drawingml/2006/main" xmlns:r="http://schemas.openxmlformats.org/officeDocument/2006/relationships" xmlns:p="http://schemas.openxmlformats.org/presentationml/2006/main">
+  <p:cSld>
+    <p:spTree>
+      <p:nvGrpSpPr>
         <p:cNvPr id="1" name="Shape 235"/>
         <p:cNvGrpSpPr/>
         <p:nvPr/>
@@ -20708,7 +22549,7 @@
 </p:sld>
 </file>
 
-<file path=ppt/slides/slide18.xml><?xml version="1.0" encoding="utf-8"?>
+<file path=ppt/slides/slide22.xml><?xml version="1.0" encoding="utf-8"?>
 <p:sld xmlns:a="http://schemas.openxmlformats.org/drawingml/2006/main" xmlns:r="http://schemas.openxmlformats.org/officeDocument/2006/relationships" xmlns:p="http://schemas.openxmlformats.org/presentationml/2006/main">
   <p:cSld>
     <p:spTree>
@@ -21677,7 +23518,7 @@
 </p:sld>
 </file>
 
-<file path=ppt/slides/slide19.xml><?xml version="1.0" encoding="utf-8"?>
+<file path=ppt/slides/slide23.xml><?xml version="1.0" encoding="utf-8"?>
 <p:sld xmlns:a="http://schemas.openxmlformats.org/drawingml/2006/main" xmlns:r="http://schemas.openxmlformats.org/officeDocument/2006/relationships" xmlns:p="http://schemas.openxmlformats.org/presentationml/2006/main">
   <p:cSld>
     <p:spTree>
@@ -21807,400 +23648,7 @@
 </p:sld>
 </file>
 
-<file path=ppt/slides/slide2.xml><?xml version="1.0" encoding="utf-8"?>
-<p:sld xmlns:a="http://schemas.openxmlformats.org/drawingml/2006/main" xmlns:r="http://schemas.openxmlformats.org/officeDocument/2006/relationships" xmlns:p="http://schemas.openxmlformats.org/presentationml/2006/main">
-  <p:cSld>
-    <p:spTree>
-      <p:nvGrpSpPr>
-        <p:cNvPr id="1" name="Shape 80"/>
-        <p:cNvGrpSpPr/>
-        <p:nvPr/>
-      </p:nvGrpSpPr>
-      <p:grpSpPr>
-        <a:xfrm>
-          <a:off x="0" y="0"/>
-          <a:ext cx="0" cy="0"/>
-          <a:chOff x="0" y="0"/>
-          <a:chExt cx="0" cy="0"/>
-        </a:xfrm>
-      </p:grpSpPr>
-      <p:sp>
-        <p:nvSpPr>
-          <p:cNvPr id="81" name="Google Shape;81;p2"/>
-          <p:cNvSpPr txBox="1">
-            <a:spLocks noGrp="1"/>
-          </p:cNvSpPr>
-          <p:nvPr>
-            <p:ph type="title"/>
-          </p:nvPr>
-        </p:nvSpPr>
-        <p:spPr>
-          <a:xfrm>
-            <a:off x="471900" y="174125"/>
-            <a:ext cx="8222100" cy="1332300"/>
-          </a:xfrm>
-          <a:prstGeom prst="rect">
-            <a:avLst/>
-          </a:prstGeom>
-          <a:noFill/>
-          <a:ln>
-            <a:noFill/>
-          </a:ln>
-        </p:spPr>
-        <p:txBody>
-          <a:bodyPr spcFirstLastPara="1" wrap="square" lIns="91425" tIns="91425" rIns="91425" bIns="91425" anchor="b" anchorCtr="0">
-            <a:noAutofit/>
-          </a:bodyPr>
-          <a:lstStyle/>
-          <a:p>
-            <a:pPr marL="0" lvl="0" indent="0" algn="ctr" rtl="0">
-              <a:lnSpc>
-                <a:spcPct val="120000"/>
-              </a:lnSpc>
-              <a:spcBef>
-                <a:spcPts val="1000"/>
-              </a:spcBef>
-              <a:spcAft>
-                <a:spcPts val="0"/>
-              </a:spcAft>
-              <a:buSzPts val="990"/>
-              <a:buNone/>
-            </a:pPr>
-            <a:r>
-              <a:rPr lang="en" sz="2818">
-                <a:latin typeface="Arial"/>
-                <a:ea typeface="Arial"/>
-                <a:cs typeface="Arial"/>
-                <a:sym typeface="Arial"/>
-              </a:rPr>
-              <a:t>Redes Recurrentes</a:t>
-            </a:r>
-            <a:endParaRPr sz="2818">
-              <a:latin typeface="Arial"/>
-              <a:ea typeface="Arial"/>
-              <a:cs typeface="Arial"/>
-              <a:sym typeface="Arial"/>
-            </a:endParaRPr>
-          </a:p>
-          <a:p>
-            <a:pPr marL="0" lvl="0" indent="0" algn="ctr" rtl="0">
-              <a:lnSpc>
-                <a:spcPct val="120000"/>
-              </a:lnSpc>
-              <a:spcBef>
-                <a:spcPts val="1000"/>
-              </a:spcBef>
-              <a:spcAft>
-                <a:spcPts val="0"/>
-              </a:spcAft>
-              <a:buSzPts val="990"/>
-              <a:buNone/>
-            </a:pPr>
-            <a:r>
-              <a:rPr lang="en" sz="2818">
-                <a:latin typeface="Arial"/>
-                <a:ea typeface="Arial"/>
-                <a:cs typeface="Arial"/>
-                <a:sym typeface="Arial"/>
-              </a:rPr>
-              <a:t>Recurrent Neural Network (RNN)</a:t>
-            </a:r>
-            <a:endParaRPr sz="2208"/>
-          </a:p>
-        </p:txBody>
-      </p:sp>
-      <p:sp>
-        <p:nvSpPr>
-          <p:cNvPr id="82" name="Google Shape;82;p2"/>
-          <p:cNvSpPr txBox="1">
-            <a:spLocks noGrp="1"/>
-          </p:cNvSpPr>
-          <p:nvPr>
-            <p:ph type="body" idx="1"/>
-          </p:nvPr>
-        </p:nvSpPr>
-        <p:spPr>
-          <a:xfrm>
-            <a:off x="471900" y="1986025"/>
-            <a:ext cx="3358800" cy="3050400"/>
-          </a:xfrm>
-          <a:prstGeom prst="rect">
-            <a:avLst/>
-          </a:prstGeom>
-          <a:noFill/>
-          <a:ln>
-            <a:noFill/>
-          </a:ln>
-        </p:spPr>
-        <p:txBody>
-          <a:bodyPr spcFirstLastPara="1" wrap="square" lIns="91425" tIns="91425" rIns="91425" bIns="91425" anchor="t" anchorCtr="0">
-            <a:noAutofit/>
-          </a:bodyPr>
-          <a:lstStyle/>
-          <a:p>
-            <a:pPr marL="0" lvl="0" indent="0" algn="l" rtl="0">
-              <a:lnSpc>
-                <a:spcPct val="95000"/>
-              </a:lnSpc>
-              <a:spcBef>
-                <a:spcPts val="0"/>
-              </a:spcBef>
-              <a:spcAft>
-                <a:spcPts val="0"/>
-              </a:spcAft>
-              <a:buSzPts val="1018"/>
-              <a:buNone/>
-            </a:pPr>
-            <a:r>
-              <a:rPr lang="en">
-                <a:solidFill>
-                  <a:schemeClr val="dk2"/>
-                </a:solidFill>
-              </a:rPr>
-              <a:t>. Introducción</a:t>
-            </a:r>
-            <a:endParaRPr>
-              <a:solidFill>
-                <a:schemeClr val="dk2"/>
-              </a:solidFill>
-            </a:endParaRPr>
-          </a:p>
-          <a:p>
-            <a:pPr marL="0" lvl="0" indent="0" algn="l" rtl="0">
-              <a:lnSpc>
-                <a:spcPct val="95000"/>
-              </a:lnSpc>
-              <a:spcBef>
-                <a:spcPts val="1200"/>
-              </a:spcBef>
-              <a:spcAft>
-                <a:spcPts val="0"/>
-              </a:spcAft>
-              <a:buSzPts val="1018"/>
-              <a:buNone/>
-            </a:pPr>
-            <a:r>
-              <a:rPr lang="en">
-                <a:solidFill>
-                  <a:schemeClr val="dk2"/>
-                </a:solidFill>
-              </a:rPr>
-              <a:t>. Neurona recurrente básica</a:t>
-            </a:r>
-            <a:endParaRPr>
-              <a:solidFill>
-                <a:schemeClr val="dk2"/>
-              </a:solidFill>
-            </a:endParaRPr>
-          </a:p>
-          <a:p>
-            <a:pPr marL="0" lvl="0" indent="0" algn="l" rtl="0">
-              <a:lnSpc>
-                <a:spcPct val="95000"/>
-              </a:lnSpc>
-              <a:spcBef>
-                <a:spcPts val="1200"/>
-              </a:spcBef>
-              <a:spcAft>
-                <a:spcPts val="0"/>
-              </a:spcAft>
-              <a:buSzPts val="1018"/>
-              <a:buNone/>
-            </a:pPr>
-            <a:r>
-              <a:rPr lang="en">
-                <a:solidFill>
-                  <a:schemeClr val="dk2"/>
-                </a:solidFill>
-              </a:rPr>
-              <a:t>. Implementación en pytorch</a:t>
-            </a:r>
-            <a:endParaRPr>
-              <a:solidFill>
-                <a:schemeClr val="dk2"/>
-              </a:solidFill>
-            </a:endParaRPr>
-          </a:p>
-          <a:p>
-            <a:pPr marL="0" lvl="0" indent="0" algn="l" rtl="0">
-              <a:lnSpc>
-                <a:spcPct val="95000"/>
-              </a:lnSpc>
-              <a:spcBef>
-                <a:spcPts val="1200"/>
-              </a:spcBef>
-              <a:spcAft>
-                <a:spcPts val="0"/>
-              </a:spcAft>
-              <a:buSzPts val="1018"/>
-              <a:buNone/>
-            </a:pPr>
-            <a:r>
-              <a:rPr lang="en">
-                <a:solidFill>
-                  <a:schemeClr val="dk2"/>
-                </a:solidFill>
-              </a:rPr>
-              <a:t>. Back propagation through time (BPTT)</a:t>
-            </a:r>
-            <a:endParaRPr>
-              <a:solidFill>
-                <a:schemeClr val="dk2"/>
-              </a:solidFill>
-            </a:endParaRPr>
-          </a:p>
-        </p:txBody>
-      </p:sp>
-      <p:pic>
-        <p:nvPicPr>
-          <p:cNvPr id="83" name="Google Shape;83;p2"/>
-          <p:cNvPicPr preferRelativeResize="0"/>
-          <p:nvPr/>
-        </p:nvPicPr>
-        <p:blipFill rotWithShape="1">
-          <a:blip r:embed="rId3">
-            <a:alphaModFix/>
-          </a:blip>
-          <a:srcRect/>
-          <a:stretch/>
-        </p:blipFill>
-        <p:spPr>
-          <a:xfrm>
-            <a:off x="8130475" y="4138900"/>
-            <a:ext cx="790275" cy="790275"/>
-          </a:xfrm>
-          <a:prstGeom prst="rect">
-            <a:avLst/>
-          </a:prstGeom>
-          <a:noFill/>
-          <a:ln>
-            <a:noFill/>
-          </a:ln>
-        </p:spPr>
-      </p:pic>
-      <p:sp>
-        <p:nvSpPr>
-          <p:cNvPr id="84" name="Google Shape;84;p2"/>
-          <p:cNvSpPr txBox="1">
-            <a:spLocks noGrp="1"/>
-          </p:cNvSpPr>
-          <p:nvPr>
-            <p:ph type="body" idx="1"/>
-          </p:nvPr>
-        </p:nvSpPr>
-        <p:spPr>
-          <a:xfrm>
-            <a:off x="4070850" y="1928300"/>
-            <a:ext cx="4100100" cy="3050400"/>
-          </a:xfrm>
-          <a:prstGeom prst="rect">
-            <a:avLst/>
-          </a:prstGeom>
-          <a:noFill/>
-          <a:ln>
-            <a:noFill/>
-          </a:ln>
-        </p:spPr>
-        <p:txBody>
-          <a:bodyPr spcFirstLastPara="1" wrap="square" lIns="91425" tIns="91425" rIns="91425" bIns="91425" anchor="t" anchorCtr="0">
-            <a:normAutofit/>
-          </a:bodyPr>
-          <a:lstStyle/>
-          <a:p>
-            <a:pPr marL="0" lvl="0" indent="0" algn="l" rtl="0">
-              <a:lnSpc>
-                <a:spcPct val="115000"/>
-              </a:lnSpc>
-              <a:spcBef>
-                <a:spcPts val="0"/>
-              </a:spcBef>
-              <a:spcAft>
-                <a:spcPts val="0"/>
-              </a:spcAft>
-              <a:buSzPts val="1800"/>
-              <a:buNone/>
-            </a:pPr>
-            <a:r>
-              <a:rPr lang="en">
-                <a:solidFill>
-                  <a:schemeClr val="dk2"/>
-                </a:solidFill>
-              </a:rPr>
-              <a:t>. Birideccionalidad </a:t>
-            </a:r>
-            <a:endParaRPr>
-              <a:solidFill>
-                <a:schemeClr val="dk2"/>
-              </a:solidFill>
-            </a:endParaRPr>
-          </a:p>
-          <a:p>
-            <a:pPr marL="0" lvl="0" indent="0" algn="l" rtl="0">
-              <a:lnSpc>
-                <a:spcPct val="115000"/>
-              </a:lnSpc>
-              <a:spcBef>
-                <a:spcPts val="1200"/>
-              </a:spcBef>
-              <a:spcAft>
-                <a:spcPts val="0"/>
-              </a:spcAft>
-              <a:buSzPts val="1800"/>
-              <a:buNone/>
-            </a:pPr>
-            <a:r>
-              <a:rPr lang="en">
-                <a:solidFill>
-                  <a:schemeClr val="dk2"/>
-                </a:solidFill>
-              </a:rPr>
-              <a:t>. Arquitectura enconder-decoder (seq to seq)</a:t>
-            </a:r>
-            <a:endParaRPr>
-              <a:solidFill>
-                <a:schemeClr val="dk2"/>
-              </a:solidFill>
-            </a:endParaRPr>
-          </a:p>
-          <a:p>
-            <a:pPr marL="0" lvl="0" indent="0" algn="l" rtl="0">
-              <a:lnSpc>
-                <a:spcPct val="115000"/>
-              </a:lnSpc>
-              <a:spcBef>
-                <a:spcPts val="1200"/>
-              </a:spcBef>
-              <a:spcAft>
-                <a:spcPts val="0"/>
-              </a:spcAft>
-              <a:buSzPts val="1800"/>
-              <a:buNone/>
-            </a:pPr>
-            <a:r>
-              <a:rPr lang="en">
-                <a:solidFill>
-                  <a:schemeClr val="dk2"/>
-                </a:solidFill>
-              </a:rPr>
-              <a:t>. Mecanismos de atención</a:t>
-            </a:r>
-            <a:endParaRPr>
-              <a:solidFill>
-                <a:schemeClr val="dk2"/>
-              </a:solidFill>
-            </a:endParaRPr>
-          </a:p>
-        </p:txBody>
-      </p:sp>
-    </p:spTree>
-  </p:cSld>
-  <p:clrMapOvr>
-    <a:masterClrMapping/>
-  </p:clrMapOvr>
-</p:sld>
-</file>
-
-<file path=ppt/slides/slide20.xml><?xml version="1.0" encoding="utf-8"?>
+<file path=ppt/slides/slide24.xml><?xml version="1.0" encoding="utf-8"?>
 <p:sld xmlns:a="http://schemas.openxmlformats.org/drawingml/2006/main" xmlns:r="http://schemas.openxmlformats.org/officeDocument/2006/relationships" xmlns:p="http://schemas.openxmlformats.org/presentationml/2006/main">
   <p:cSld>
     <p:spTree>
@@ -22409,7 +23857,7 @@
 </p:sld>
 </file>
 
-<file path=ppt/slides/slide21.xml><?xml version="1.0" encoding="utf-8"?>
+<file path=ppt/slides/slide25.xml><?xml version="1.0" encoding="utf-8"?>
 <p:sld xmlns:a="http://schemas.openxmlformats.org/drawingml/2006/main" xmlns:r="http://schemas.openxmlformats.org/officeDocument/2006/relationships" xmlns:p="http://schemas.openxmlformats.org/presentationml/2006/main">
   <p:cSld>
     <p:spTree>
@@ -22722,7 +24170,7 @@
 </p:sld>
 </file>
 
-<file path=ppt/slides/slide22.xml><?xml version="1.0" encoding="utf-8"?>
+<file path=ppt/slides/slide26.xml><?xml version="1.0" encoding="utf-8"?>
 <p:sld xmlns:a="http://schemas.openxmlformats.org/drawingml/2006/main" xmlns:r="http://schemas.openxmlformats.org/officeDocument/2006/relationships" xmlns:p="http://schemas.openxmlformats.org/presentationml/2006/main">
   <p:cSld>
     <p:spTree>
@@ -22920,7 +24368,7 @@
 </p:sld>
 </file>
 
-<file path=ppt/slides/slide23.xml><?xml version="1.0" encoding="utf-8"?>
+<file path=ppt/slides/slide27.xml><?xml version="1.0" encoding="utf-8"?>
 <p:sld xmlns:a="http://schemas.openxmlformats.org/drawingml/2006/main" xmlns:r="http://schemas.openxmlformats.org/officeDocument/2006/relationships" xmlns:p="http://schemas.openxmlformats.org/presentationml/2006/main">
   <p:cSld>
     <p:spTree>
@@ -23507,7 +24955,7 @@
 </p:sld>
 </file>
 
-<file path=ppt/slides/slide24.xml><?xml version="1.0" encoding="utf-8"?>
+<file path=ppt/slides/slide28.xml><?xml version="1.0" encoding="utf-8"?>
 <p:sld xmlns:a="http://schemas.openxmlformats.org/drawingml/2006/main" xmlns:r="http://schemas.openxmlformats.org/officeDocument/2006/relationships" xmlns:p="http://schemas.openxmlformats.org/presentationml/2006/main">
   <p:cSld>
     <p:spTree>
@@ -23736,8 +25184,8 @@
         </p:nvSpPr>
         <p:spPr>
           <a:xfrm>
-            <a:off x="3189130" y="3740938"/>
-            <a:ext cx="1485901" cy="609850"/>
+            <a:off x="3189130" y="3729921"/>
+            <a:ext cx="1658292" cy="609850"/>
           </a:xfrm>
           <a:prstGeom prst="rect">
             <a:avLst/>
@@ -23771,7 +25219,7 @@
               <a:buNone/>
             </a:pPr>
             <a:r>
-              <a:rPr lang="en" sz="1400">
+              <a:rPr lang="en" sz="1400" dirty="0">
                 <a:latin typeface="Twentieth Century"/>
                 <a:ea typeface="Twentieth Century"/>
                 <a:cs typeface="Twentieth Century"/>
@@ -23779,7 +25227,7 @@
               </a:rPr>
               <a:t>Regresión</a:t>
             </a:r>
-            <a:endParaRPr sz="1100"/>
+            <a:endParaRPr sz="1100" dirty="0"/>
           </a:p>
           <a:p>
             <a:pPr marL="0" marR="0" lvl="0" indent="0" algn="l" rtl="0">
@@ -23800,7 +25248,7 @@
               <a:buNone/>
             </a:pPr>
             <a:r>
-              <a:rPr lang="en" sz="1400">
+              <a:rPr lang="en" sz="1400" dirty="0">
                 <a:latin typeface="Twentieth Century"/>
                 <a:ea typeface="Twentieth Century"/>
                 <a:cs typeface="Twentieth Century"/>
@@ -23808,7 +25256,7 @@
               </a:rPr>
               <a:t>Classificacion</a:t>
             </a:r>
-            <a:endParaRPr sz="1400">
+            <a:endParaRPr sz="1400" dirty="0">
               <a:latin typeface="Twentieth Century"/>
               <a:ea typeface="Twentieth Century"/>
               <a:cs typeface="Twentieth Century"/>
@@ -23834,7 +25282,7 @@
               <a:buNone/>
             </a:pPr>
             <a:r>
-              <a:rPr lang="en" sz="1400">
+              <a:rPr lang="en" sz="1400" dirty="0">
                 <a:latin typeface="Twentieth Century"/>
                 <a:ea typeface="Twentieth Century"/>
                 <a:cs typeface="Twentieth Century"/>
@@ -23842,7 +25290,7 @@
               </a:rPr>
               <a:t>Sentiment classification</a:t>
             </a:r>
-            <a:endParaRPr sz="1400">
+            <a:endParaRPr sz="1400" dirty="0">
               <a:latin typeface="Twentieth Century"/>
               <a:ea typeface="Twentieth Century"/>
               <a:cs typeface="Twentieth Century"/>
@@ -23868,7 +25316,7 @@
               <a:buNone/>
             </a:pPr>
             <a:r>
-              <a:rPr lang="en" sz="1400">
+              <a:rPr lang="en" sz="1400" dirty="0">
                 <a:latin typeface="Twentieth Century"/>
                 <a:ea typeface="Twentieth Century"/>
                 <a:cs typeface="Twentieth Century"/>
@@ -23876,7 +25324,7 @@
               </a:rPr>
               <a:t>Resumen de videos</a:t>
             </a:r>
-            <a:endParaRPr sz="1100"/>
+            <a:endParaRPr sz="1100" dirty="0"/>
           </a:p>
           <a:p>
             <a:pPr marL="0" marR="0" lvl="0" indent="0" algn="l" rtl="0">
@@ -23896,7 +25344,7 @@
               <a:buFont typeface="Arial"/>
               <a:buNone/>
             </a:pPr>
-            <a:endParaRPr sz="1400">
+            <a:endParaRPr sz="1400" dirty="0">
               <a:latin typeface="Twentieth Century"/>
               <a:ea typeface="Twentieth Century"/>
               <a:cs typeface="Twentieth Century"/>
@@ -24099,7 +25547,7 @@
 </p:sld>
 </file>
 
-<file path=ppt/slides/slide25.xml><?xml version="1.0" encoding="utf-8"?>
+<file path=ppt/slides/slide29.xml><?xml version="1.0" encoding="utf-8"?>
 <p:sld xmlns:a="http://schemas.openxmlformats.org/drawingml/2006/main" xmlns:r="http://schemas.openxmlformats.org/officeDocument/2006/relationships" xmlns:p="http://schemas.openxmlformats.org/presentationml/2006/main">
   <p:cSld>
     <p:spTree>
@@ -25052,7 +26500,394 @@
 </p:sld>
 </file>
 
-<file path=ppt/slides/slide26.xml><?xml version="1.0" encoding="utf-8"?>
+<file path=ppt/slides/slide3.xml><?xml version="1.0" encoding="utf-8"?>
+<p:sld xmlns:a="http://schemas.openxmlformats.org/drawingml/2006/main" xmlns:r="http://schemas.openxmlformats.org/officeDocument/2006/relationships" xmlns:p="http://schemas.openxmlformats.org/presentationml/2006/main">
+  <p:cSld>
+    <p:spTree>
+      <p:nvGrpSpPr>
+        <p:cNvPr id="1" name="Shape 88"/>
+        <p:cNvGrpSpPr/>
+        <p:nvPr/>
+      </p:nvGrpSpPr>
+      <p:grpSpPr>
+        <a:xfrm>
+          <a:off x="0" y="0"/>
+          <a:ext cx="0" cy="0"/>
+          <a:chOff x="0" y="0"/>
+          <a:chExt cx="0" cy="0"/>
+        </a:xfrm>
+      </p:grpSpPr>
+      <p:sp>
+        <p:nvSpPr>
+          <p:cNvPr id="89" name="Google Shape;89;g21c03c1d1e6_1_8"/>
+          <p:cNvSpPr txBox="1"/>
+          <p:nvPr/>
+        </p:nvSpPr>
+        <p:spPr>
+          <a:xfrm>
+            <a:off x="251252" y="1021834"/>
+            <a:ext cx="8641500" cy="814500"/>
+          </a:xfrm>
+          <a:prstGeom prst="rect">
+            <a:avLst/>
+          </a:prstGeom>
+          <a:noFill/>
+          <a:ln>
+            <a:noFill/>
+          </a:ln>
+        </p:spPr>
+        <p:txBody>
+          <a:bodyPr spcFirstLastPara="1" wrap="square" lIns="68575" tIns="34275" rIns="68575" bIns="34275" anchor="t" anchorCtr="0">
+            <a:noAutofit/>
+          </a:bodyPr>
+          <a:lstStyle/>
+          <a:p>
+            <a:pPr marL="0" marR="0" lvl="0" indent="0" algn="l" rtl="0">
+              <a:lnSpc>
+                <a:spcPct val="90000"/>
+              </a:lnSpc>
+              <a:spcBef>
+                <a:spcPts val="0"/>
+              </a:spcBef>
+              <a:spcAft>
+                <a:spcPts val="0"/>
+              </a:spcAft>
+              <a:buClr>
+                <a:schemeClr val="dk1"/>
+              </a:buClr>
+              <a:buSzPts val="2100"/>
+              <a:buFont typeface="Arial"/>
+              <a:buNone/>
+            </a:pPr>
+            <a:r>
+              <a:rPr lang="en" sz="2100" b="0" i="0" u="none" strike="noStrike" cap="none">
+                <a:latin typeface="Twentieth Century"/>
+                <a:ea typeface="Twentieth Century"/>
+                <a:cs typeface="Twentieth Century"/>
+                <a:sym typeface="Twentieth Century"/>
+              </a:rPr>
+              <a:t>Red neuronal </a:t>
+            </a:r>
+            <a:r>
+              <a:rPr lang="en" sz="2100" b="1" i="0" u="none" strike="noStrike" cap="none">
+                <a:latin typeface="Twentieth Century"/>
+                <a:ea typeface="Twentieth Century"/>
+                <a:cs typeface="Twentieth Century"/>
+                <a:sym typeface="Twentieth Century"/>
+              </a:rPr>
+              <a:t>favorita</a:t>
+            </a:r>
+            <a:r>
+              <a:rPr lang="en" sz="2100" b="0" i="0" u="none" strike="noStrike" cap="none">
+                <a:latin typeface="Twentieth Century"/>
+                <a:ea typeface="Twentieth Century"/>
+                <a:cs typeface="Twentieth Century"/>
+                <a:sym typeface="Twentieth Century"/>
+              </a:rPr>
+              <a:t> para el trabajo secuencias ( datos que en cuya naturaleza exista un </a:t>
+            </a:r>
+            <a:r>
+              <a:rPr lang="en" sz="2100" b="1" i="0" u="none" strike="noStrike" cap="none">
+                <a:latin typeface="Twentieth Century"/>
+                <a:ea typeface="Twentieth Century"/>
+                <a:cs typeface="Twentieth Century"/>
+                <a:sym typeface="Twentieth Century"/>
+              </a:rPr>
+              <a:t>comportamiento secuencial</a:t>
+            </a:r>
+            <a:r>
+              <a:rPr lang="en" sz="2100" b="0" i="0" u="none" strike="noStrike" cap="none">
+                <a:latin typeface="Twentieth Century"/>
+                <a:ea typeface="Twentieth Century"/>
+                <a:cs typeface="Twentieth Century"/>
+                <a:sym typeface="Twentieth Century"/>
+              </a:rPr>
+              <a:t>):</a:t>
+            </a:r>
+            <a:endParaRPr sz="1100"/>
+          </a:p>
+          <a:p>
+            <a:pPr marL="0" marR="0" lvl="0" indent="0" algn="l" rtl="0">
+              <a:lnSpc>
+                <a:spcPct val="90000"/>
+              </a:lnSpc>
+              <a:spcBef>
+                <a:spcPts val="800"/>
+              </a:spcBef>
+              <a:spcAft>
+                <a:spcPts val="0"/>
+              </a:spcAft>
+              <a:buClr>
+                <a:schemeClr val="lt1"/>
+              </a:buClr>
+              <a:buSzPts val="2100"/>
+              <a:buFont typeface="Arial"/>
+              <a:buNone/>
+            </a:pPr>
+            <a:endParaRPr sz="2100" b="0" i="0" u="none" strike="noStrike" cap="none">
+              <a:latin typeface="Twentieth Century"/>
+              <a:ea typeface="Twentieth Century"/>
+              <a:cs typeface="Twentieth Century"/>
+              <a:sym typeface="Twentieth Century"/>
+            </a:endParaRPr>
+          </a:p>
+          <a:p>
+            <a:pPr marL="0" marR="0" lvl="0" indent="0" algn="l" rtl="0">
+              <a:lnSpc>
+                <a:spcPct val="90000"/>
+              </a:lnSpc>
+              <a:spcBef>
+                <a:spcPts val="800"/>
+              </a:spcBef>
+              <a:spcAft>
+                <a:spcPts val="0"/>
+              </a:spcAft>
+              <a:buClr>
+                <a:schemeClr val="dk1"/>
+              </a:buClr>
+              <a:buSzPts val="2100"/>
+              <a:buFont typeface="Arial"/>
+              <a:buNone/>
+            </a:pPr>
+            <a:r>
+              <a:rPr lang="en" sz="2100" b="0" i="0" u="none" strike="noStrike" cap="none">
+                <a:latin typeface="Twentieth Century"/>
+                <a:ea typeface="Twentieth Century"/>
+                <a:cs typeface="Twentieth Century"/>
+                <a:sym typeface="Twentieth Century"/>
+              </a:rPr>
+              <a:t>	- señales temporales</a:t>
+            </a:r>
+            <a:endParaRPr sz="1100"/>
+          </a:p>
+          <a:p>
+            <a:pPr marL="0" marR="0" lvl="0" indent="0" algn="l" rtl="0">
+              <a:lnSpc>
+                <a:spcPct val="90000"/>
+              </a:lnSpc>
+              <a:spcBef>
+                <a:spcPts val="800"/>
+              </a:spcBef>
+              <a:spcAft>
+                <a:spcPts val="0"/>
+              </a:spcAft>
+              <a:buClr>
+                <a:schemeClr val="dk1"/>
+              </a:buClr>
+              <a:buSzPts val="2100"/>
+              <a:buFont typeface="Arial"/>
+              <a:buNone/>
+            </a:pPr>
+            <a:r>
+              <a:rPr lang="en" sz="2100" b="0" i="0" u="none" strike="noStrike" cap="none">
+                <a:latin typeface="Twentieth Century"/>
+                <a:ea typeface="Twentieth Century"/>
+                <a:cs typeface="Twentieth Century"/>
+                <a:sym typeface="Twentieth Century"/>
+              </a:rPr>
+              <a:t>	- series temporales</a:t>
+            </a:r>
+            <a:endParaRPr sz="1100"/>
+          </a:p>
+          <a:p>
+            <a:pPr marL="0" marR="0" lvl="0" indent="0" algn="l" rtl="0">
+              <a:lnSpc>
+                <a:spcPct val="90000"/>
+              </a:lnSpc>
+              <a:spcBef>
+                <a:spcPts val="800"/>
+              </a:spcBef>
+              <a:spcAft>
+                <a:spcPts val="0"/>
+              </a:spcAft>
+              <a:buClr>
+                <a:schemeClr val="dk1"/>
+              </a:buClr>
+              <a:buSzPts val="2100"/>
+              <a:buFont typeface="Arial"/>
+              <a:buNone/>
+            </a:pPr>
+            <a:r>
+              <a:rPr lang="en" sz="2100" b="0" i="0" u="none" strike="noStrike" cap="none">
+                <a:latin typeface="Twentieth Century"/>
+                <a:ea typeface="Twentieth Century"/>
+                <a:cs typeface="Twentieth Century"/>
+                <a:sym typeface="Twentieth Century"/>
+              </a:rPr>
+              <a:t>	- texto</a:t>
+            </a:r>
+            <a:endParaRPr sz="1100"/>
+          </a:p>
+          <a:p>
+            <a:pPr marL="0" marR="0" lvl="0" indent="0" algn="l" rtl="0">
+              <a:lnSpc>
+                <a:spcPct val="90000"/>
+              </a:lnSpc>
+              <a:spcBef>
+                <a:spcPts val="800"/>
+              </a:spcBef>
+              <a:spcAft>
+                <a:spcPts val="0"/>
+              </a:spcAft>
+              <a:buClr>
+                <a:schemeClr val="dk1"/>
+              </a:buClr>
+              <a:buSzPts val="2100"/>
+              <a:buFont typeface="Arial"/>
+              <a:buNone/>
+            </a:pPr>
+            <a:r>
+              <a:rPr lang="en" sz="2100" b="0" i="0" u="none" strike="noStrike" cap="none">
+                <a:latin typeface="Twentieth Century"/>
+                <a:ea typeface="Twentieth Century"/>
+                <a:cs typeface="Twentieth Century"/>
+                <a:sym typeface="Twentieth Century"/>
+              </a:rPr>
+              <a:t>	- habla</a:t>
+            </a:r>
+            <a:endParaRPr sz="1100"/>
+          </a:p>
+          <a:p>
+            <a:pPr marL="0" marR="0" lvl="0" indent="0" algn="l" rtl="0">
+              <a:lnSpc>
+                <a:spcPct val="90000"/>
+              </a:lnSpc>
+              <a:spcBef>
+                <a:spcPts val="800"/>
+              </a:spcBef>
+              <a:spcAft>
+                <a:spcPts val="0"/>
+              </a:spcAft>
+              <a:buClr>
+                <a:schemeClr val="dk1"/>
+              </a:buClr>
+              <a:buSzPts val="2100"/>
+              <a:buFont typeface="Arial"/>
+              <a:buNone/>
+            </a:pPr>
+            <a:r>
+              <a:rPr lang="en" sz="2100" b="0" i="0" u="none" strike="noStrike" cap="none">
+                <a:latin typeface="Twentieth Century"/>
+                <a:ea typeface="Twentieth Century"/>
+                <a:cs typeface="Twentieth Century"/>
+                <a:sym typeface="Twentieth Century"/>
+              </a:rPr>
+              <a:t>	- música</a:t>
+            </a:r>
+            <a:endParaRPr sz="1100"/>
+          </a:p>
+          <a:p>
+            <a:pPr marL="0" marR="0" lvl="0" indent="0" algn="l" rtl="0">
+              <a:lnSpc>
+                <a:spcPct val="90000"/>
+              </a:lnSpc>
+              <a:spcBef>
+                <a:spcPts val="800"/>
+              </a:spcBef>
+              <a:spcAft>
+                <a:spcPts val="0"/>
+              </a:spcAft>
+              <a:buClr>
+                <a:schemeClr val="dk1"/>
+              </a:buClr>
+              <a:buSzPts val="2100"/>
+              <a:buFont typeface="Arial"/>
+              <a:buNone/>
+            </a:pPr>
+            <a:r>
+              <a:rPr lang="en" sz="2100" b="0" i="0" u="none" strike="noStrike" cap="none">
+                <a:latin typeface="Twentieth Century"/>
+                <a:ea typeface="Twentieth Century"/>
+                <a:cs typeface="Twentieth Century"/>
+                <a:sym typeface="Twentieth Century"/>
+              </a:rPr>
+              <a:t>	- etc</a:t>
+            </a:r>
+            <a:endParaRPr sz="2100" b="0" i="0" u="none" strike="noStrike" cap="none">
+              <a:latin typeface="Twentieth Century"/>
+              <a:ea typeface="Twentieth Century"/>
+              <a:cs typeface="Twentieth Century"/>
+              <a:sym typeface="Twentieth Century"/>
+            </a:endParaRPr>
+          </a:p>
+          <a:p>
+            <a:pPr marL="0" marR="0" lvl="0" indent="0" algn="l" rtl="0">
+              <a:lnSpc>
+                <a:spcPct val="90000"/>
+              </a:lnSpc>
+              <a:spcBef>
+                <a:spcPts val="800"/>
+              </a:spcBef>
+              <a:spcAft>
+                <a:spcPts val="0"/>
+              </a:spcAft>
+              <a:buClr>
+                <a:schemeClr val="lt1"/>
+              </a:buClr>
+              <a:buSzPts val="2100"/>
+              <a:buFont typeface="Arial"/>
+              <a:buNone/>
+            </a:pPr>
+            <a:endParaRPr sz="2100" b="0" i="0" u="none" strike="noStrike" cap="none">
+              <a:latin typeface="Twentieth Century"/>
+              <a:ea typeface="Twentieth Century"/>
+              <a:cs typeface="Twentieth Century"/>
+              <a:sym typeface="Twentieth Century"/>
+            </a:endParaRPr>
+          </a:p>
+        </p:txBody>
+      </p:sp>
+      <p:sp>
+        <p:nvSpPr>
+          <p:cNvPr id="90" name="Google Shape;90;g21c03c1d1e6_1_8"/>
+          <p:cNvSpPr txBox="1">
+            <a:spLocks noGrp="1"/>
+          </p:cNvSpPr>
+          <p:nvPr>
+            <p:ph type="title"/>
+          </p:nvPr>
+        </p:nvSpPr>
+        <p:spPr>
+          <a:xfrm>
+            <a:off x="98250" y="16350"/>
+            <a:ext cx="8826600" cy="602700"/>
+          </a:xfrm>
+          <a:prstGeom prst="rect">
+            <a:avLst/>
+          </a:prstGeom>
+        </p:spPr>
+        <p:txBody>
+          <a:bodyPr spcFirstLastPara="1" wrap="square" lIns="91425" tIns="91425" rIns="91425" bIns="91425" anchor="ctr" anchorCtr="0">
+            <a:normAutofit/>
+          </a:bodyPr>
+          <a:lstStyle/>
+          <a:p>
+            <a:pPr marL="0" lvl="0" indent="0" algn="l" rtl="0">
+              <a:spcBef>
+                <a:spcPts val="0"/>
+              </a:spcBef>
+              <a:spcAft>
+                <a:spcPts val="0"/>
+              </a:spcAft>
+              <a:buNone/>
+            </a:pPr>
+            <a:r>
+              <a:rPr lang="en"/>
+              <a:t>Redes recurrentes - Introducción</a:t>
+            </a:r>
+            <a:endParaRPr/>
+          </a:p>
+        </p:txBody>
+      </p:sp>
+    </p:spTree>
+  </p:cSld>
+  <p:clrMapOvr>
+    <a:masterClrMapping/>
+  </p:clrMapOvr>
+</p:sld>
+</file>
+
+<file path=ppt/slides/slide30.xml><?xml version="1.0" encoding="utf-8"?>
 <p:sld xmlns:a="http://schemas.openxmlformats.org/drawingml/2006/main" xmlns:r="http://schemas.openxmlformats.org/officeDocument/2006/relationships" xmlns:p="http://schemas.openxmlformats.org/presentationml/2006/main">
   <p:cSld>
     <p:spTree>
@@ -25366,7 +27201,7 @@
 </p:sld>
 </file>
 
-<file path=ppt/slides/slide27.xml><?xml version="1.0" encoding="utf-8"?>
+<file path=ppt/slides/slide31.xml><?xml version="1.0" encoding="utf-8"?>
 <p:sld xmlns:a="http://schemas.openxmlformats.org/drawingml/2006/main" xmlns:r="http://schemas.openxmlformats.org/officeDocument/2006/relationships" xmlns:p="http://schemas.openxmlformats.org/presentationml/2006/main">
   <p:cSld>
     <p:spTree>
@@ -25678,7 +27513,7 @@
 </p:sld>
 </file>
 
-<file path=ppt/slides/slide28.xml><?xml version="1.0" encoding="utf-8"?>
+<file path=ppt/slides/slide32.xml><?xml version="1.0" encoding="utf-8"?>
 <p:sld xmlns:a="http://schemas.openxmlformats.org/drawingml/2006/main" xmlns:r="http://schemas.openxmlformats.org/officeDocument/2006/relationships" xmlns:p="http://schemas.openxmlformats.org/presentationml/2006/main">
   <p:cSld>
     <p:spTree>
@@ -25992,7 +27827,7 @@
 </p:sld>
 </file>
 
-<file path=ppt/slides/slide29.xml><?xml version="1.0" encoding="utf-8"?>
+<file path=ppt/slides/slide33.xml><?xml version="1.0" encoding="utf-8"?>
 <p:sld xmlns:a="http://schemas.openxmlformats.org/drawingml/2006/main" xmlns:r="http://schemas.openxmlformats.org/officeDocument/2006/relationships" xmlns:p="http://schemas.openxmlformats.org/presentationml/2006/main">
   <p:cSld>
     <p:spTree>
@@ -26414,394 +28249,7 @@
 </p:sld>
 </file>
 
-<file path=ppt/slides/slide3.xml><?xml version="1.0" encoding="utf-8"?>
-<p:sld xmlns:a="http://schemas.openxmlformats.org/drawingml/2006/main" xmlns:r="http://schemas.openxmlformats.org/officeDocument/2006/relationships" xmlns:p="http://schemas.openxmlformats.org/presentationml/2006/main">
-  <p:cSld>
-    <p:spTree>
-      <p:nvGrpSpPr>
-        <p:cNvPr id="1" name="Shape 88"/>
-        <p:cNvGrpSpPr/>
-        <p:nvPr/>
-      </p:nvGrpSpPr>
-      <p:grpSpPr>
-        <a:xfrm>
-          <a:off x="0" y="0"/>
-          <a:ext cx="0" cy="0"/>
-          <a:chOff x="0" y="0"/>
-          <a:chExt cx="0" cy="0"/>
-        </a:xfrm>
-      </p:grpSpPr>
-      <p:sp>
-        <p:nvSpPr>
-          <p:cNvPr id="89" name="Google Shape;89;g21c03c1d1e6_1_8"/>
-          <p:cNvSpPr txBox="1"/>
-          <p:nvPr/>
-        </p:nvSpPr>
-        <p:spPr>
-          <a:xfrm>
-            <a:off x="251252" y="1021834"/>
-            <a:ext cx="8641500" cy="814500"/>
-          </a:xfrm>
-          <a:prstGeom prst="rect">
-            <a:avLst/>
-          </a:prstGeom>
-          <a:noFill/>
-          <a:ln>
-            <a:noFill/>
-          </a:ln>
-        </p:spPr>
-        <p:txBody>
-          <a:bodyPr spcFirstLastPara="1" wrap="square" lIns="68575" tIns="34275" rIns="68575" bIns="34275" anchor="t" anchorCtr="0">
-            <a:noAutofit/>
-          </a:bodyPr>
-          <a:lstStyle/>
-          <a:p>
-            <a:pPr marL="0" marR="0" lvl="0" indent="0" algn="l" rtl="0">
-              <a:lnSpc>
-                <a:spcPct val="90000"/>
-              </a:lnSpc>
-              <a:spcBef>
-                <a:spcPts val="0"/>
-              </a:spcBef>
-              <a:spcAft>
-                <a:spcPts val="0"/>
-              </a:spcAft>
-              <a:buClr>
-                <a:schemeClr val="dk1"/>
-              </a:buClr>
-              <a:buSzPts val="2100"/>
-              <a:buFont typeface="Arial"/>
-              <a:buNone/>
-            </a:pPr>
-            <a:r>
-              <a:rPr lang="en" sz="2100" b="0" i="0" u="none" strike="noStrike" cap="none">
-                <a:latin typeface="Twentieth Century"/>
-                <a:ea typeface="Twentieth Century"/>
-                <a:cs typeface="Twentieth Century"/>
-                <a:sym typeface="Twentieth Century"/>
-              </a:rPr>
-              <a:t>Red neuronal </a:t>
-            </a:r>
-            <a:r>
-              <a:rPr lang="en" sz="2100" b="1" i="0" u="none" strike="noStrike" cap="none">
-                <a:latin typeface="Twentieth Century"/>
-                <a:ea typeface="Twentieth Century"/>
-                <a:cs typeface="Twentieth Century"/>
-                <a:sym typeface="Twentieth Century"/>
-              </a:rPr>
-              <a:t>favorita</a:t>
-            </a:r>
-            <a:r>
-              <a:rPr lang="en" sz="2100" b="0" i="0" u="none" strike="noStrike" cap="none">
-                <a:latin typeface="Twentieth Century"/>
-                <a:ea typeface="Twentieth Century"/>
-                <a:cs typeface="Twentieth Century"/>
-                <a:sym typeface="Twentieth Century"/>
-              </a:rPr>
-              <a:t> para el trabajo secuencias ( datos que en cuya naturaleza exista un </a:t>
-            </a:r>
-            <a:r>
-              <a:rPr lang="en" sz="2100" b="1" i="0" u="none" strike="noStrike" cap="none">
-                <a:latin typeface="Twentieth Century"/>
-                <a:ea typeface="Twentieth Century"/>
-                <a:cs typeface="Twentieth Century"/>
-                <a:sym typeface="Twentieth Century"/>
-              </a:rPr>
-              <a:t>comportamiento secuencial</a:t>
-            </a:r>
-            <a:r>
-              <a:rPr lang="en" sz="2100" b="0" i="0" u="none" strike="noStrike" cap="none">
-                <a:latin typeface="Twentieth Century"/>
-                <a:ea typeface="Twentieth Century"/>
-                <a:cs typeface="Twentieth Century"/>
-                <a:sym typeface="Twentieth Century"/>
-              </a:rPr>
-              <a:t>):</a:t>
-            </a:r>
-            <a:endParaRPr sz="1100"/>
-          </a:p>
-          <a:p>
-            <a:pPr marL="0" marR="0" lvl="0" indent="0" algn="l" rtl="0">
-              <a:lnSpc>
-                <a:spcPct val="90000"/>
-              </a:lnSpc>
-              <a:spcBef>
-                <a:spcPts val="800"/>
-              </a:spcBef>
-              <a:spcAft>
-                <a:spcPts val="0"/>
-              </a:spcAft>
-              <a:buClr>
-                <a:schemeClr val="lt1"/>
-              </a:buClr>
-              <a:buSzPts val="2100"/>
-              <a:buFont typeface="Arial"/>
-              <a:buNone/>
-            </a:pPr>
-            <a:endParaRPr sz="2100" b="0" i="0" u="none" strike="noStrike" cap="none">
-              <a:latin typeface="Twentieth Century"/>
-              <a:ea typeface="Twentieth Century"/>
-              <a:cs typeface="Twentieth Century"/>
-              <a:sym typeface="Twentieth Century"/>
-            </a:endParaRPr>
-          </a:p>
-          <a:p>
-            <a:pPr marL="0" marR="0" lvl="0" indent="0" algn="l" rtl="0">
-              <a:lnSpc>
-                <a:spcPct val="90000"/>
-              </a:lnSpc>
-              <a:spcBef>
-                <a:spcPts val="800"/>
-              </a:spcBef>
-              <a:spcAft>
-                <a:spcPts val="0"/>
-              </a:spcAft>
-              <a:buClr>
-                <a:schemeClr val="dk1"/>
-              </a:buClr>
-              <a:buSzPts val="2100"/>
-              <a:buFont typeface="Arial"/>
-              <a:buNone/>
-            </a:pPr>
-            <a:r>
-              <a:rPr lang="en" sz="2100" b="0" i="0" u="none" strike="noStrike" cap="none">
-                <a:latin typeface="Twentieth Century"/>
-                <a:ea typeface="Twentieth Century"/>
-                <a:cs typeface="Twentieth Century"/>
-                <a:sym typeface="Twentieth Century"/>
-              </a:rPr>
-              <a:t>	- señales temporales</a:t>
-            </a:r>
-            <a:endParaRPr sz="1100"/>
-          </a:p>
-          <a:p>
-            <a:pPr marL="0" marR="0" lvl="0" indent="0" algn="l" rtl="0">
-              <a:lnSpc>
-                <a:spcPct val="90000"/>
-              </a:lnSpc>
-              <a:spcBef>
-                <a:spcPts val="800"/>
-              </a:spcBef>
-              <a:spcAft>
-                <a:spcPts val="0"/>
-              </a:spcAft>
-              <a:buClr>
-                <a:schemeClr val="dk1"/>
-              </a:buClr>
-              <a:buSzPts val="2100"/>
-              <a:buFont typeface="Arial"/>
-              <a:buNone/>
-            </a:pPr>
-            <a:r>
-              <a:rPr lang="en" sz="2100" b="0" i="0" u="none" strike="noStrike" cap="none">
-                <a:latin typeface="Twentieth Century"/>
-                <a:ea typeface="Twentieth Century"/>
-                <a:cs typeface="Twentieth Century"/>
-                <a:sym typeface="Twentieth Century"/>
-              </a:rPr>
-              <a:t>	- series temporales</a:t>
-            </a:r>
-            <a:endParaRPr sz="1100"/>
-          </a:p>
-          <a:p>
-            <a:pPr marL="0" marR="0" lvl="0" indent="0" algn="l" rtl="0">
-              <a:lnSpc>
-                <a:spcPct val="90000"/>
-              </a:lnSpc>
-              <a:spcBef>
-                <a:spcPts val="800"/>
-              </a:spcBef>
-              <a:spcAft>
-                <a:spcPts val="0"/>
-              </a:spcAft>
-              <a:buClr>
-                <a:schemeClr val="dk1"/>
-              </a:buClr>
-              <a:buSzPts val="2100"/>
-              <a:buFont typeface="Arial"/>
-              <a:buNone/>
-            </a:pPr>
-            <a:r>
-              <a:rPr lang="en" sz="2100" b="0" i="0" u="none" strike="noStrike" cap="none">
-                <a:latin typeface="Twentieth Century"/>
-                <a:ea typeface="Twentieth Century"/>
-                <a:cs typeface="Twentieth Century"/>
-                <a:sym typeface="Twentieth Century"/>
-              </a:rPr>
-              <a:t>	- texto</a:t>
-            </a:r>
-            <a:endParaRPr sz="1100"/>
-          </a:p>
-          <a:p>
-            <a:pPr marL="0" marR="0" lvl="0" indent="0" algn="l" rtl="0">
-              <a:lnSpc>
-                <a:spcPct val="90000"/>
-              </a:lnSpc>
-              <a:spcBef>
-                <a:spcPts val="800"/>
-              </a:spcBef>
-              <a:spcAft>
-                <a:spcPts val="0"/>
-              </a:spcAft>
-              <a:buClr>
-                <a:schemeClr val="dk1"/>
-              </a:buClr>
-              <a:buSzPts val="2100"/>
-              <a:buFont typeface="Arial"/>
-              <a:buNone/>
-            </a:pPr>
-            <a:r>
-              <a:rPr lang="en" sz="2100" b="0" i="0" u="none" strike="noStrike" cap="none">
-                <a:latin typeface="Twentieth Century"/>
-                <a:ea typeface="Twentieth Century"/>
-                <a:cs typeface="Twentieth Century"/>
-                <a:sym typeface="Twentieth Century"/>
-              </a:rPr>
-              <a:t>	- habla</a:t>
-            </a:r>
-            <a:endParaRPr sz="1100"/>
-          </a:p>
-          <a:p>
-            <a:pPr marL="0" marR="0" lvl="0" indent="0" algn="l" rtl="0">
-              <a:lnSpc>
-                <a:spcPct val="90000"/>
-              </a:lnSpc>
-              <a:spcBef>
-                <a:spcPts val="800"/>
-              </a:spcBef>
-              <a:spcAft>
-                <a:spcPts val="0"/>
-              </a:spcAft>
-              <a:buClr>
-                <a:schemeClr val="dk1"/>
-              </a:buClr>
-              <a:buSzPts val="2100"/>
-              <a:buFont typeface="Arial"/>
-              <a:buNone/>
-            </a:pPr>
-            <a:r>
-              <a:rPr lang="en" sz="2100" b="0" i="0" u="none" strike="noStrike" cap="none">
-                <a:latin typeface="Twentieth Century"/>
-                <a:ea typeface="Twentieth Century"/>
-                <a:cs typeface="Twentieth Century"/>
-                <a:sym typeface="Twentieth Century"/>
-              </a:rPr>
-              <a:t>	- música</a:t>
-            </a:r>
-            <a:endParaRPr sz="1100"/>
-          </a:p>
-          <a:p>
-            <a:pPr marL="0" marR="0" lvl="0" indent="0" algn="l" rtl="0">
-              <a:lnSpc>
-                <a:spcPct val="90000"/>
-              </a:lnSpc>
-              <a:spcBef>
-                <a:spcPts val="800"/>
-              </a:spcBef>
-              <a:spcAft>
-                <a:spcPts val="0"/>
-              </a:spcAft>
-              <a:buClr>
-                <a:schemeClr val="dk1"/>
-              </a:buClr>
-              <a:buSzPts val="2100"/>
-              <a:buFont typeface="Arial"/>
-              <a:buNone/>
-            </a:pPr>
-            <a:r>
-              <a:rPr lang="en" sz="2100" b="0" i="0" u="none" strike="noStrike" cap="none">
-                <a:latin typeface="Twentieth Century"/>
-                <a:ea typeface="Twentieth Century"/>
-                <a:cs typeface="Twentieth Century"/>
-                <a:sym typeface="Twentieth Century"/>
-              </a:rPr>
-              <a:t>	- etc</a:t>
-            </a:r>
-            <a:endParaRPr sz="2100" b="0" i="0" u="none" strike="noStrike" cap="none">
-              <a:latin typeface="Twentieth Century"/>
-              <a:ea typeface="Twentieth Century"/>
-              <a:cs typeface="Twentieth Century"/>
-              <a:sym typeface="Twentieth Century"/>
-            </a:endParaRPr>
-          </a:p>
-          <a:p>
-            <a:pPr marL="0" marR="0" lvl="0" indent="0" algn="l" rtl="0">
-              <a:lnSpc>
-                <a:spcPct val="90000"/>
-              </a:lnSpc>
-              <a:spcBef>
-                <a:spcPts val="800"/>
-              </a:spcBef>
-              <a:spcAft>
-                <a:spcPts val="0"/>
-              </a:spcAft>
-              <a:buClr>
-                <a:schemeClr val="lt1"/>
-              </a:buClr>
-              <a:buSzPts val="2100"/>
-              <a:buFont typeface="Arial"/>
-              <a:buNone/>
-            </a:pPr>
-            <a:endParaRPr sz="2100" b="0" i="0" u="none" strike="noStrike" cap="none">
-              <a:latin typeface="Twentieth Century"/>
-              <a:ea typeface="Twentieth Century"/>
-              <a:cs typeface="Twentieth Century"/>
-              <a:sym typeface="Twentieth Century"/>
-            </a:endParaRPr>
-          </a:p>
-        </p:txBody>
-      </p:sp>
-      <p:sp>
-        <p:nvSpPr>
-          <p:cNvPr id="90" name="Google Shape;90;g21c03c1d1e6_1_8"/>
-          <p:cNvSpPr txBox="1">
-            <a:spLocks noGrp="1"/>
-          </p:cNvSpPr>
-          <p:nvPr>
-            <p:ph type="title"/>
-          </p:nvPr>
-        </p:nvSpPr>
-        <p:spPr>
-          <a:xfrm>
-            <a:off x="98250" y="16350"/>
-            <a:ext cx="8826600" cy="602700"/>
-          </a:xfrm>
-          <a:prstGeom prst="rect">
-            <a:avLst/>
-          </a:prstGeom>
-        </p:spPr>
-        <p:txBody>
-          <a:bodyPr spcFirstLastPara="1" wrap="square" lIns="91425" tIns="91425" rIns="91425" bIns="91425" anchor="ctr" anchorCtr="0">
-            <a:normAutofit/>
-          </a:bodyPr>
-          <a:lstStyle/>
-          <a:p>
-            <a:pPr marL="0" lvl="0" indent="0" algn="l" rtl="0">
-              <a:spcBef>
-                <a:spcPts val="0"/>
-              </a:spcBef>
-              <a:spcAft>
-                <a:spcPts val="0"/>
-              </a:spcAft>
-              <a:buNone/>
-            </a:pPr>
-            <a:r>
-              <a:rPr lang="en"/>
-              <a:t>Redes recurrentes - Introducción</a:t>
-            </a:r>
-            <a:endParaRPr/>
-          </a:p>
-        </p:txBody>
-      </p:sp>
-    </p:spTree>
-  </p:cSld>
-  <p:clrMapOvr>
-    <a:masterClrMapping/>
-  </p:clrMapOvr>
-</p:sld>
-</file>
-
-<file path=ppt/slides/slide30.xml><?xml version="1.0" encoding="utf-8"?>
+<file path=ppt/slides/slide34.xml><?xml version="1.0" encoding="utf-8"?>
 <p:sld xmlns:a="http://schemas.openxmlformats.org/drawingml/2006/main" xmlns:r="http://schemas.openxmlformats.org/officeDocument/2006/relationships" xmlns:p="http://schemas.openxmlformats.org/presentationml/2006/main">
   <p:cSld>
     <p:spTree>
@@ -27493,7 +28941,7 @@
 </p:sld>
 </file>
 
-<file path=ppt/slides/slide31.xml><?xml version="1.0" encoding="utf-8"?>
+<file path=ppt/slides/slide35.xml><?xml version="1.0" encoding="utf-8"?>
 <p:sld xmlns:a="http://schemas.openxmlformats.org/drawingml/2006/main" xmlns:r="http://schemas.openxmlformats.org/officeDocument/2006/relationships" xmlns:p="http://schemas.openxmlformats.org/presentationml/2006/main">
   <p:cSld>
     <p:spTree>
@@ -28347,7 +29795,7 @@
 </p:sld>
 </file>
 
-<file path=ppt/slides/slide32.xml><?xml version="1.0" encoding="utf-8"?>
+<file path=ppt/slides/slide36.xml><?xml version="1.0" encoding="utf-8"?>
 <p:sld xmlns:a="http://schemas.openxmlformats.org/drawingml/2006/main" xmlns:r="http://schemas.openxmlformats.org/officeDocument/2006/relationships" xmlns:p="http://schemas.openxmlformats.org/presentationml/2006/main">
   <p:cSld>
     <p:spTree>
@@ -29345,7 +30793,7 @@
 </p:sld>
 </file>
 
-<file path=ppt/slides/slide33.xml><?xml version="1.0" encoding="utf-8"?>
+<file path=ppt/slides/slide37.xml><?xml version="1.0" encoding="utf-8"?>
 <p:sld xmlns:a="http://schemas.openxmlformats.org/drawingml/2006/main" xmlns:r="http://schemas.openxmlformats.org/officeDocument/2006/relationships" xmlns:p="http://schemas.openxmlformats.org/presentationml/2006/main">
   <p:cSld>
     <p:spTree>
@@ -29944,7 +31392,7 @@
 </p:sld>
 </file>
 
-<file path=ppt/slides/slide34.xml><?xml version="1.0" encoding="utf-8"?>
+<file path=ppt/slides/slide38.xml><?xml version="1.0" encoding="utf-8"?>
 <p:sld xmlns:a="http://schemas.openxmlformats.org/drawingml/2006/main" xmlns:r="http://schemas.openxmlformats.org/officeDocument/2006/relationships" xmlns:p="http://schemas.openxmlformats.org/presentationml/2006/main">
   <p:cSld>
     <p:spTree>
@@ -30440,7 +31888,7 @@
 </p:sld>
 </file>
 
-<file path=ppt/slides/slide35.xml><?xml version="1.0" encoding="utf-8"?>
+<file path=ppt/slides/slide39.xml><?xml version="1.0" encoding="utf-8"?>
 <p:sld xmlns:a="http://schemas.openxmlformats.org/drawingml/2006/main" xmlns:r="http://schemas.openxmlformats.org/officeDocument/2006/relationships" xmlns:p="http://schemas.openxmlformats.org/presentationml/2006/main">
   <p:cSld>
     <p:spTree>

</xml_diff>